<commit_message>
Added functions to record traces of nnovelcells as function of time, with interface to python get_nnovelcells and save on N button. Completed first draft of results 4.2.
</commit_message>
<xml_diff>
--- a/fastgenegol/genelifepy/images/Figure_assembly.pptx
+++ b/fastgenegol/genelifepy/images/Figure_assembly.pptx
@@ -6,10 +6,9 @@
   </p:sldMasterIdLst>
   <p:sldIdLst>
     <p:sldId id="256" r:id="rId2"/>
-    <p:sldId id="257" r:id="rId3"/>
-    <p:sldId id="258" r:id="rId4"/>
-    <p:sldId id="259" r:id="rId5"/>
-    <p:sldId id="260" r:id="rId6"/>
+    <p:sldId id="261" r:id="rId3"/>
+    <p:sldId id="262" r:id="rId4"/>
+    <p:sldId id="263" r:id="rId5"/>
   </p:sldIdLst>
   <p:sldSz cx="9144000" cy="5143500" type="screen16x9"/>
   <p:notesSz cx="6858000" cy="9144000"/>
@@ -3509,10 +3508,520 @@
           <a:chExt cx="0" cy="0"/>
         </a:xfrm>
       </p:grpSpPr>
+      <p:grpSp>
+        <p:nvGrpSpPr>
+          <p:cNvPr id="3" name="Group 2">
+            <a:extLst>
+              <a:ext uri="{FF2B5EF4-FFF2-40B4-BE49-F238E27FC236}">
+                <a16:creationId xmlns:a16="http://schemas.microsoft.com/office/drawing/2014/main" id="{6F389F6F-58A4-D341-87EA-286070FB3282}"/>
+              </a:ext>
+            </a:extLst>
+          </p:cNvPr>
+          <p:cNvGrpSpPr/>
+          <p:nvPr/>
+        </p:nvGrpSpPr>
+        <p:grpSpPr>
+          <a:xfrm>
+            <a:off x="0" y="4002"/>
+            <a:ext cx="7897660" cy="5169790"/>
+            <a:chOff x="0" y="4002"/>
+            <a:chExt cx="7897660" cy="5169790"/>
+          </a:xfrm>
+        </p:grpSpPr>
+        <p:sp>
+          <p:nvSpPr>
+            <p:cNvPr id="2" name="Rectangle 1">
+              <a:extLst>
+                <a:ext uri="{FF2B5EF4-FFF2-40B4-BE49-F238E27FC236}">
+                  <a16:creationId xmlns:a16="http://schemas.microsoft.com/office/drawing/2014/main" id="{6AE9D4EF-5C9C-3E4F-8E05-B43D377159A8}"/>
+                </a:ext>
+              </a:extLst>
+            </p:cNvPr>
+            <p:cNvSpPr/>
+            <p:nvPr/>
+          </p:nvSpPr>
+          <p:spPr>
+            <a:xfrm>
+              <a:off x="5201498" y="2534576"/>
+              <a:ext cx="2677373" cy="2615187"/>
+            </a:xfrm>
+            <a:prstGeom prst="rect">
+              <a:avLst/>
+            </a:prstGeom>
+            <a:solidFill>
+              <a:schemeClr val="bg1"/>
+            </a:solidFill>
+          </p:spPr>
+          <p:style>
+            <a:lnRef idx="2">
+              <a:schemeClr val="accent1">
+                <a:shade val="50000"/>
+              </a:schemeClr>
+            </a:lnRef>
+            <a:fillRef idx="1">
+              <a:schemeClr val="accent1"/>
+            </a:fillRef>
+            <a:effectRef idx="0">
+              <a:schemeClr val="accent1"/>
+            </a:effectRef>
+            <a:fontRef idx="minor">
+              <a:schemeClr val="lt1"/>
+            </a:fontRef>
+          </p:style>
+          <p:txBody>
+            <a:bodyPr rtlCol="0" anchor="ctr"/>
+            <a:lstStyle/>
+            <a:p>
+              <a:pPr algn="ctr"/>
+              <a:endParaRPr lang="en-US"/>
+            </a:p>
+          </p:txBody>
+        </p:sp>
+        <p:pic>
+          <p:nvPicPr>
+            <p:cNvPr id="19" name="Picture 18">
+              <a:extLst>
+                <a:ext uri="{FF2B5EF4-FFF2-40B4-BE49-F238E27FC236}">
+                  <a16:creationId xmlns:a16="http://schemas.microsoft.com/office/drawing/2014/main" id="{F6391EBD-5AE5-6144-B11E-BD102BE871ED}"/>
+                </a:ext>
+              </a:extLst>
+            </p:cNvPr>
+            <p:cNvPicPr>
+              <a:picLocks noChangeAspect="1"/>
+            </p:cNvPicPr>
+            <p:nvPr/>
+          </p:nvPicPr>
+          <p:blipFill>
+            <a:blip r:embed="rId2"/>
+            <a:stretch>
+              <a:fillRect/>
+            </a:stretch>
+          </p:blipFill>
+          <p:spPr>
+            <a:xfrm>
+              <a:off x="5305046" y="21149"/>
+              <a:ext cx="2519310" cy="2511166"/>
+            </a:xfrm>
+            <a:prstGeom prst="rect">
+              <a:avLst/>
+            </a:prstGeom>
+          </p:spPr>
+        </p:pic>
+        <p:pic>
+          <p:nvPicPr>
+            <p:cNvPr id="23" name="Picture 22">
+              <a:extLst>
+                <a:ext uri="{FF2B5EF4-FFF2-40B4-BE49-F238E27FC236}">
+                  <a16:creationId xmlns:a16="http://schemas.microsoft.com/office/drawing/2014/main" id="{34603D87-BE7B-2842-8B64-39B8E1CA4F5D}"/>
+                </a:ext>
+              </a:extLst>
+            </p:cNvPr>
+            <p:cNvPicPr>
+              <a:picLocks noChangeAspect="1"/>
+            </p:cNvPicPr>
+            <p:nvPr/>
+          </p:nvPicPr>
+          <p:blipFill>
+            <a:blip r:embed="rId3"/>
+            <a:stretch>
+              <a:fillRect/>
+            </a:stretch>
+          </p:blipFill>
+          <p:spPr>
+            <a:xfrm>
+              <a:off x="17870" y="2575752"/>
+              <a:ext cx="2519311" cy="2598040"/>
+            </a:xfrm>
+            <a:prstGeom prst="rect">
+              <a:avLst/>
+            </a:prstGeom>
+          </p:spPr>
+        </p:pic>
+        <p:pic>
+          <p:nvPicPr>
+            <p:cNvPr id="25" name="Picture 24">
+              <a:extLst>
+                <a:ext uri="{FF2B5EF4-FFF2-40B4-BE49-F238E27FC236}">
+                  <a16:creationId xmlns:a16="http://schemas.microsoft.com/office/drawing/2014/main" id="{186FCE58-2F13-4B44-97DC-FF76D9ED2D74}"/>
+                </a:ext>
+              </a:extLst>
+            </p:cNvPr>
+            <p:cNvPicPr>
+              <a:picLocks noChangeAspect="1"/>
+            </p:cNvPicPr>
+            <p:nvPr/>
+          </p:nvPicPr>
+          <p:blipFill>
+            <a:blip r:embed="rId4"/>
+            <a:stretch>
+              <a:fillRect/>
+            </a:stretch>
+          </p:blipFill>
+          <p:spPr>
+            <a:xfrm>
+              <a:off x="2663397" y="2575753"/>
+              <a:ext cx="2519311" cy="2598039"/>
+            </a:xfrm>
+            <a:prstGeom prst="rect">
+              <a:avLst/>
+            </a:prstGeom>
+          </p:spPr>
+        </p:pic>
+        <p:pic>
+          <p:nvPicPr>
+            <p:cNvPr id="27" name="Picture 26">
+              <a:extLst>
+                <a:ext uri="{FF2B5EF4-FFF2-40B4-BE49-F238E27FC236}">
+                  <a16:creationId xmlns:a16="http://schemas.microsoft.com/office/drawing/2014/main" id="{28B193C4-4927-D34C-8961-CFA339352E4E}"/>
+                </a:ext>
+              </a:extLst>
+            </p:cNvPr>
+            <p:cNvPicPr>
+              <a:picLocks noChangeAspect="1"/>
+            </p:cNvPicPr>
+            <p:nvPr/>
+          </p:nvPicPr>
+          <p:blipFill>
+            <a:blip r:embed="rId5"/>
+            <a:stretch>
+              <a:fillRect/>
+            </a:stretch>
+          </p:blipFill>
+          <p:spPr>
+            <a:xfrm>
+              <a:off x="17869" y="4002"/>
+              <a:ext cx="2519312" cy="2598041"/>
+            </a:xfrm>
+            <a:prstGeom prst="rect">
+              <a:avLst/>
+            </a:prstGeom>
+          </p:spPr>
+        </p:pic>
+        <p:pic>
+          <p:nvPicPr>
+            <p:cNvPr id="29" name="Picture 28">
+              <a:extLst>
+                <a:ext uri="{FF2B5EF4-FFF2-40B4-BE49-F238E27FC236}">
+                  <a16:creationId xmlns:a16="http://schemas.microsoft.com/office/drawing/2014/main" id="{95EAA22F-A1F5-634D-9D13-66EBB8079CB2}"/>
+                </a:ext>
+              </a:extLst>
+            </p:cNvPr>
+            <p:cNvPicPr>
+              <a:picLocks noChangeAspect="1"/>
+            </p:cNvPicPr>
+            <p:nvPr/>
+          </p:nvPicPr>
+          <p:blipFill>
+            <a:blip r:embed="rId6"/>
+            <a:stretch>
+              <a:fillRect/>
+            </a:stretch>
+          </p:blipFill>
+          <p:spPr>
+            <a:xfrm>
+              <a:off x="2663397" y="4002"/>
+              <a:ext cx="1959582" cy="2571750"/>
+            </a:xfrm>
+            <a:prstGeom prst="rect">
+              <a:avLst/>
+            </a:prstGeom>
+          </p:spPr>
+        </p:pic>
+        <p:pic>
+          <p:nvPicPr>
+            <p:cNvPr id="31" name="Picture 30">
+              <a:extLst>
+                <a:ext uri="{FF2B5EF4-FFF2-40B4-BE49-F238E27FC236}">
+                  <a16:creationId xmlns:a16="http://schemas.microsoft.com/office/drawing/2014/main" id="{005836B6-5908-EA43-8714-2EE22B43695F}"/>
+                </a:ext>
+              </a:extLst>
+            </p:cNvPr>
+            <p:cNvPicPr>
+              <a:picLocks noChangeAspect="1"/>
+            </p:cNvPicPr>
+            <p:nvPr/>
+          </p:nvPicPr>
+          <p:blipFill>
+            <a:blip r:embed="rId7"/>
+            <a:stretch>
+              <a:fillRect/>
+            </a:stretch>
+          </p:blipFill>
+          <p:spPr>
+            <a:xfrm>
+              <a:off x="4681727" y="21149"/>
+              <a:ext cx="500981" cy="2554602"/>
+            </a:xfrm>
+            <a:prstGeom prst="rect">
+              <a:avLst/>
+            </a:prstGeom>
+          </p:spPr>
+        </p:pic>
+        <p:sp>
+          <p:nvSpPr>
+            <p:cNvPr id="33" name="TextBox 32">
+              <a:extLst>
+                <a:ext uri="{FF2B5EF4-FFF2-40B4-BE49-F238E27FC236}">
+                  <a16:creationId xmlns:a16="http://schemas.microsoft.com/office/drawing/2014/main" id="{81FA97AF-1F64-BC4F-A870-815DADB8DD50}"/>
+                </a:ext>
+              </a:extLst>
+            </p:cNvPr>
+            <p:cNvSpPr txBox="1"/>
+            <p:nvPr/>
+          </p:nvSpPr>
+          <p:spPr>
+            <a:xfrm>
+              <a:off x="17869" y="17147"/>
+              <a:ext cx="307808" cy="369332"/>
+            </a:xfrm>
+            <a:prstGeom prst="rect">
+              <a:avLst/>
+            </a:prstGeom>
+            <a:noFill/>
+          </p:spPr>
+          <p:txBody>
+            <a:bodyPr wrap="square" rtlCol="0">
+              <a:spAutoFit/>
+            </a:bodyPr>
+            <a:lstStyle/>
+            <a:p>
+              <a:r>
+                <a:rPr lang="en-US" dirty="0">
+                  <a:solidFill>
+                    <a:schemeClr val="bg1"/>
+                  </a:solidFill>
+                </a:rPr>
+                <a:t>a</a:t>
+              </a:r>
+            </a:p>
+          </p:txBody>
+        </p:sp>
+        <p:sp>
+          <p:nvSpPr>
+            <p:cNvPr id="34" name="TextBox 33">
+              <a:extLst>
+                <a:ext uri="{FF2B5EF4-FFF2-40B4-BE49-F238E27FC236}">
+                  <a16:creationId xmlns:a16="http://schemas.microsoft.com/office/drawing/2014/main" id="{4C15FD35-95B4-5945-A178-13CE572277BA}"/>
+                </a:ext>
+              </a:extLst>
+            </p:cNvPr>
+            <p:cNvSpPr txBox="1"/>
+            <p:nvPr/>
+          </p:nvSpPr>
+          <p:spPr>
+            <a:xfrm>
+              <a:off x="0" y="2588897"/>
+              <a:ext cx="307808" cy="369332"/>
+            </a:xfrm>
+            <a:prstGeom prst="rect">
+              <a:avLst/>
+            </a:prstGeom>
+            <a:noFill/>
+          </p:spPr>
+          <p:txBody>
+            <a:bodyPr wrap="square" rtlCol="0">
+              <a:spAutoFit/>
+            </a:bodyPr>
+            <a:lstStyle/>
+            <a:p>
+              <a:r>
+                <a:rPr lang="en-US" dirty="0">
+                  <a:solidFill>
+                    <a:schemeClr val="bg1"/>
+                  </a:solidFill>
+                </a:rPr>
+                <a:t>d</a:t>
+              </a:r>
+            </a:p>
+          </p:txBody>
+        </p:sp>
+        <p:sp>
+          <p:nvSpPr>
+            <p:cNvPr id="35" name="TextBox 34">
+              <a:extLst>
+                <a:ext uri="{FF2B5EF4-FFF2-40B4-BE49-F238E27FC236}">
+                  <a16:creationId xmlns:a16="http://schemas.microsoft.com/office/drawing/2014/main" id="{7630A256-05D2-B148-8FA9-E2F14C9B1790}"/>
+                </a:ext>
+              </a:extLst>
+            </p:cNvPr>
+            <p:cNvSpPr txBox="1"/>
+            <p:nvPr/>
+          </p:nvSpPr>
+          <p:spPr>
+            <a:xfrm>
+              <a:off x="2724311" y="32206"/>
+              <a:ext cx="307808" cy="369332"/>
+            </a:xfrm>
+            <a:prstGeom prst="rect">
+              <a:avLst/>
+            </a:prstGeom>
+            <a:noFill/>
+          </p:spPr>
+          <p:txBody>
+            <a:bodyPr wrap="square" rtlCol="0">
+              <a:spAutoFit/>
+            </a:bodyPr>
+            <a:lstStyle/>
+            <a:p>
+              <a:r>
+                <a:rPr lang="en-US" dirty="0">
+                  <a:solidFill>
+                    <a:schemeClr val="bg1"/>
+                  </a:solidFill>
+                </a:rPr>
+                <a:t>b</a:t>
+              </a:r>
+            </a:p>
+          </p:txBody>
+        </p:sp>
+        <p:sp>
+          <p:nvSpPr>
+            <p:cNvPr id="36" name="TextBox 35">
+              <a:extLst>
+                <a:ext uri="{FF2B5EF4-FFF2-40B4-BE49-F238E27FC236}">
+                  <a16:creationId xmlns:a16="http://schemas.microsoft.com/office/drawing/2014/main" id="{7C704B76-FDA9-1043-ACAE-BFAB1E564ED7}"/>
+                </a:ext>
+              </a:extLst>
+            </p:cNvPr>
+            <p:cNvSpPr txBox="1"/>
+            <p:nvPr/>
+          </p:nvSpPr>
+          <p:spPr>
+            <a:xfrm>
+              <a:off x="5324709" y="43090"/>
+              <a:ext cx="307808" cy="369332"/>
+            </a:xfrm>
+            <a:prstGeom prst="rect">
+              <a:avLst/>
+            </a:prstGeom>
+            <a:noFill/>
+          </p:spPr>
+          <p:txBody>
+            <a:bodyPr wrap="square" rtlCol="0">
+              <a:spAutoFit/>
+            </a:bodyPr>
+            <a:lstStyle/>
+            <a:p>
+              <a:r>
+                <a:rPr lang="en-US" dirty="0">
+                  <a:solidFill>
+                    <a:schemeClr val="bg1"/>
+                  </a:solidFill>
+                </a:rPr>
+                <a:t>c</a:t>
+              </a:r>
+            </a:p>
+          </p:txBody>
+        </p:sp>
+        <p:sp>
+          <p:nvSpPr>
+            <p:cNvPr id="37" name="TextBox 36">
+              <a:extLst>
+                <a:ext uri="{FF2B5EF4-FFF2-40B4-BE49-F238E27FC236}">
+                  <a16:creationId xmlns:a16="http://schemas.microsoft.com/office/drawing/2014/main" id="{A58D2809-9694-164E-B2D3-A84825AA9B30}"/>
+                </a:ext>
+              </a:extLst>
+            </p:cNvPr>
+            <p:cNvSpPr txBox="1"/>
+            <p:nvPr/>
+          </p:nvSpPr>
+          <p:spPr>
+            <a:xfrm>
+              <a:off x="2659520" y="2528313"/>
+              <a:ext cx="307808" cy="369332"/>
+            </a:xfrm>
+            <a:prstGeom prst="rect">
+              <a:avLst/>
+            </a:prstGeom>
+            <a:noFill/>
+          </p:spPr>
+          <p:txBody>
+            <a:bodyPr wrap="square" rtlCol="0">
+              <a:spAutoFit/>
+            </a:bodyPr>
+            <a:lstStyle/>
+            <a:p>
+              <a:r>
+                <a:rPr lang="en-US" dirty="0">
+                  <a:solidFill>
+                    <a:schemeClr val="bg1"/>
+                  </a:solidFill>
+                </a:rPr>
+                <a:t>e</a:t>
+              </a:r>
+            </a:p>
+          </p:txBody>
+        </p:sp>
+        <p:sp>
+          <p:nvSpPr>
+            <p:cNvPr id="38" name="TextBox 37">
+              <a:extLst>
+                <a:ext uri="{FF2B5EF4-FFF2-40B4-BE49-F238E27FC236}">
+                  <a16:creationId xmlns:a16="http://schemas.microsoft.com/office/drawing/2014/main" id="{1E161FBE-23E7-604B-BAC3-9DABE1FE96D9}"/>
+                </a:ext>
+              </a:extLst>
+            </p:cNvPr>
+            <p:cNvSpPr txBox="1"/>
+            <p:nvPr/>
+          </p:nvSpPr>
+          <p:spPr>
+            <a:xfrm>
+              <a:off x="5305046" y="2528313"/>
+              <a:ext cx="307808" cy="369332"/>
+            </a:xfrm>
+            <a:prstGeom prst="rect">
+              <a:avLst/>
+            </a:prstGeom>
+            <a:noFill/>
+          </p:spPr>
+          <p:txBody>
+            <a:bodyPr wrap="square" rtlCol="0">
+              <a:spAutoFit/>
+            </a:bodyPr>
+            <a:lstStyle/>
+            <a:p>
+              <a:r>
+                <a:rPr lang="en-US" dirty="0"/>
+                <a:t>f</a:t>
+              </a:r>
+            </a:p>
+          </p:txBody>
+        </p:sp>
+        <p:pic>
+          <p:nvPicPr>
+            <p:cNvPr id="18" name="Picture 17">
+              <a:extLst>
+                <a:ext uri="{FF2B5EF4-FFF2-40B4-BE49-F238E27FC236}">
+                  <a16:creationId xmlns:a16="http://schemas.microsoft.com/office/drawing/2014/main" id="{2D5D4A39-E6F8-5340-8DE5-78889B53C9CC}"/>
+                </a:ext>
+              </a:extLst>
+            </p:cNvPr>
+            <p:cNvPicPr>
+              <a:picLocks noChangeAspect="1"/>
+            </p:cNvPicPr>
+            <p:nvPr/>
+          </p:nvPicPr>
+          <p:blipFill>
+            <a:blip r:embed="rId8"/>
+            <a:stretch>
+              <a:fillRect/>
+            </a:stretch>
+          </p:blipFill>
+          <p:spPr>
+            <a:xfrm>
+              <a:off x="5201498" y="2897645"/>
+              <a:ext cx="2696162" cy="2228708"/>
+            </a:xfrm>
+            <a:prstGeom prst="rect">
+              <a:avLst/>
+            </a:prstGeom>
+          </p:spPr>
+        </p:pic>
+      </p:grpSp>
     </p:spTree>
     <p:extLst>
       <p:ext uri="{BB962C8B-B14F-4D97-AF65-F5344CB8AC3E}">
-        <p14:creationId xmlns:p14="http://schemas.microsoft.com/office/powerpoint/2010/main" val="1129695278"/>
+        <p14:creationId xmlns:p14="http://schemas.microsoft.com/office/powerpoint/2010/main" val="2633845221"/>
       </p:ext>
     </p:extLst>
   </p:cSld>
@@ -3525,14 +4034,1864 @@
 <file path=ppt/slides/slide3.xml><?xml version="1.0" encoding="utf-8"?>
 <p:sld xmlns:a="http://schemas.openxmlformats.org/drawingml/2006/main" xmlns:r="http://schemas.openxmlformats.org/officeDocument/2006/relationships" xmlns:p="http://schemas.openxmlformats.org/presentationml/2006/main">
   <p:cSld>
-    <p:bg>
-      <p:bgPr>
-        <a:solidFill>
-          <a:schemeClr val="tx1"/>
-        </a:solidFill>
-        <a:effectLst/>
-      </p:bgPr>
-    </p:bg>
+    <p:spTree>
+      <p:nvGrpSpPr>
+        <p:cNvPr id="1" name=""/>
+        <p:cNvGrpSpPr/>
+        <p:nvPr/>
+      </p:nvGrpSpPr>
+      <p:grpSpPr>
+        <a:xfrm>
+          <a:off x="0" y="0"/>
+          <a:ext cx="0" cy="0"/>
+          <a:chOff x="0" y="0"/>
+          <a:chExt cx="0" cy="0"/>
+        </a:xfrm>
+      </p:grpSpPr>
+      <p:grpSp>
+        <p:nvGrpSpPr>
+          <p:cNvPr id="65" name="Group 64">
+            <a:extLst>
+              <a:ext uri="{FF2B5EF4-FFF2-40B4-BE49-F238E27FC236}">
+                <a16:creationId xmlns:a16="http://schemas.microsoft.com/office/drawing/2014/main" id="{BF7E292B-2B2B-9349-B516-B74B58A6848F}"/>
+              </a:ext>
+            </a:extLst>
+          </p:cNvPr>
+          <p:cNvGrpSpPr/>
+          <p:nvPr/>
+        </p:nvGrpSpPr>
+        <p:grpSpPr>
+          <a:xfrm>
+            <a:off x="17869" y="17147"/>
+            <a:ext cx="8061831" cy="5111625"/>
+            <a:chOff x="17869" y="17147"/>
+            <a:chExt cx="8061831" cy="5111625"/>
+          </a:xfrm>
+        </p:grpSpPr>
+        <p:pic>
+          <p:nvPicPr>
+            <p:cNvPr id="58" name="Picture 57">
+              <a:extLst>
+                <a:ext uri="{FF2B5EF4-FFF2-40B4-BE49-F238E27FC236}">
+                  <a16:creationId xmlns:a16="http://schemas.microsoft.com/office/drawing/2014/main" id="{1EF3692E-75AB-3044-81AE-B6D48B1D811E}"/>
+                </a:ext>
+              </a:extLst>
+            </p:cNvPr>
+            <p:cNvPicPr>
+              <a:picLocks noChangeAspect="1"/>
+            </p:cNvPicPr>
+            <p:nvPr/>
+          </p:nvPicPr>
+          <p:blipFill>
+            <a:blip r:embed="rId2"/>
+            <a:stretch>
+              <a:fillRect/>
+            </a:stretch>
+          </p:blipFill>
+          <p:spPr>
+            <a:xfrm>
+              <a:off x="129318" y="115961"/>
+              <a:ext cx="3800068" cy="2539744"/>
+            </a:xfrm>
+            <a:prstGeom prst="rect">
+              <a:avLst/>
+            </a:prstGeom>
+          </p:spPr>
+        </p:pic>
+        <p:pic>
+          <p:nvPicPr>
+            <p:cNvPr id="57" name="Picture 56">
+              <a:extLst>
+                <a:ext uri="{FF2B5EF4-FFF2-40B4-BE49-F238E27FC236}">
+                  <a16:creationId xmlns:a16="http://schemas.microsoft.com/office/drawing/2014/main" id="{284FAFA0-BCF4-6C47-9DC2-320D3A1B99E9}"/>
+                </a:ext>
+              </a:extLst>
+            </p:cNvPr>
+            <p:cNvPicPr>
+              <a:picLocks noChangeAspect="1"/>
+            </p:cNvPicPr>
+            <p:nvPr/>
+          </p:nvPicPr>
+          <p:blipFill>
+            <a:blip r:embed="rId3"/>
+            <a:stretch>
+              <a:fillRect/>
+            </a:stretch>
+          </p:blipFill>
+          <p:spPr>
+            <a:xfrm>
+              <a:off x="4232316" y="2589295"/>
+              <a:ext cx="3799669" cy="2539477"/>
+            </a:xfrm>
+            <a:prstGeom prst="rect">
+              <a:avLst/>
+            </a:prstGeom>
+          </p:spPr>
+        </p:pic>
+        <p:grpSp>
+          <p:nvGrpSpPr>
+            <p:cNvPr id="15" name="Group 14">
+              <a:extLst>
+                <a:ext uri="{FF2B5EF4-FFF2-40B4-BE49-F238E27FC236}">
+                  <a16:creationId xmlns:a16="http://schemas.microsoft.com/office/drawing/2014/main" id="{000088F1-11B0-3944-82E7-7F16390848B5}"/>
+                </a:ext>
+              </a:extLst>
+            </p:cNvPr>
+            <p:cNvGrpSpPr/>
+            <p:nvPr/>
+          </p:nvGrpSpPr>
+          <p:grpSpPr>
+            <a:xfrm>
+              <a:off x="132023" y="675277"/>
+              <a:ext cx="3799670" cy="4423424"/>
+              <a:chOff x="2048506" y="-1047605"/>
+              <a:chExt cx="3799670" cy="4476431"/>
+            </a:xfrm>
+          </p:grpSpPr>
+          <p:pic>
+            <p:nvPicPr>
+              <p:cNvPr id="4" name="Picture 3">
+                <a:extLst>
+                  <a:ext uri="{FF2B5EF4-FFF2-40B4-BE49-F238E27FC236}">
+                    <a16:creationId xmlns:a16="http://schemas.microsoft.com/office/drawing/2014/main" id="{3019AEDB-72AC-FA41-8459-905BFE573D31}"/>
+                  </a:ext>
+                </a:extLst>
+              </p:cNvPr>
+              <p:cNvPicPr>
+                <a:picLocks noChangeAspect="1"/>
+              </p:cNvPicPr>
+              <p:nvPr/>
+            </p:nvPicPr>
+            <p:blipFill>
+              <a:blip r:embed="rId4"/>
+              <a:stretch>
+                <a:fillRect/>
+              </a:stretch>
+            </p:blipFill>
+            <p:spPr>
+              <a:xfrm>
+                <a:off x="2048506" y="889348"/>
+                <a:ext cx="3799670" cy="2539478"/>
+              </a:xfrm>
+              <a:prstGeom prst="rect">
+                <a:avLst/>
+              </a:prstGeom>
+            </p:spPr>
+          </p:pic>
+          <p:sp>
+            <p:nvSpPr>
+              <p:cNvPr id="5" name="TextBox 4">
+                <a:extLst>
+                  <a:ext uri="{FF2B5EF4-FFF2-40B4-BE49-F238E27FC236}">
+                    <a16:creationId xmlns:a16="http://schemas.microsoft.com/office/drawing/2014/main" id="{64892085-E6D0-CA4F-BEA6-33106BE06FF3}"/>
+                  </a:ext>
+                </a:extLst>
+              </p:cNvPr>
+              <p:cNvSpPr txBox="1"/>
+              <p:nvPr/>
+            </p:nvSpPr>
+            <p:spPr>
+              <a:xfrm>
+                <a:off x="3025036" y="1146131"/>
+                <a:ext cx="419622" cy="246221"/>
+              </a:xfrm>
+              <a:prstGeom prst="rect">
+                <a:avLst/>
+              </a:prstGeom>
+              <a:noFill/>
+            </p:spPr>
+            <p:txBody>
+              <a:bodyPr wrap="square" rtlCol="0">
+                <a:spAutoFit/>
+              </a:bodyPr>
+              <a:lstStyle/>
+              <a:p>
+                <a:r>
+                  <a:rPr lang="en-US" sz="1000" dirty="0"/>
+                  <a:t>111</a:t>
+                </a:r>
+              </a:p>
+            </p:txBody>
+          </p:sp>
+          <p:sp>
+            <p:nvSpPr>
+              <p:cNvPr id="6" name="TextBox 5">
+                <a:extLst>
+                  <a:ext uri="{FF2B5EF4-FFF2-40B4-BE49-F238E27FC236}">
+                    <a16:creationId xmlns:a16="http://schemas.microsoft.com/office/drawing/2014/main" id="{0C16DE2B-D766-DE4E-A721-15B194B65BB5}"/>
+                  </a:ext>
+                </a:extLst>
+              </p:cNvPr>
+              <p:cNvSpPr txBox="1"/>
+              <p:nvPr/>
+            </p:nvSpPr>
+            <p:spPr>
+              <a:xfrm>
+                <a:off x="3845491" y="1352810"/>
+                <a:ext cx="419622" cy="246221"/>
+              </a:xfrm>
+              <a:prstGeom prst="rect">
+                <a:avLst/>
+              </a:prstGeom>
+              <a:noFill/>
+            </p:spPr>
+            <p:txBody>
+              <a:bodyPr wrap="square" rtlCol="0">
+                <a:spAutoFit/>
+              </a:bodyPr>
+              <a:lstStyle/>
+              <a:p>
+                <a:r>
+                  <a:rPr lang="en-US" sz="1000" dirty="0"/>
+                  <a:t>111</a:t>
+                </a:r>
+              </a:p>
+            </p:txBody>
+          </p:sp>
+          <p:sp>
+            <p:nvSpPr>
+              <p:cNvPr id="7" name="TextBox 6">
+                <a:extLst>
+                  <a:ext uri="{FF2B5EF4-FFF2-40B4-BE49-F238E27FC236}">
+                    <a16:creationId xmlns:a16="http://schemas.microsoft.com/office/drawing/2014/main" id="{B224A93F-3D9A-2C4D-8E61-F8E0A8368993}"/>
+                  </a:ext>
+                </a:extLst>
+              </p:cNvPr>
+              <p:cNvSpPr txBox="1"/>
+              <p:nvPr/>
+            </p:nvSpPr>
+            <p:spPr>
+              <a:xfrm>
+                <a:off x="4390373" y="1377863"/>
+                <a:ext cx="419622" cy="246221"/>
+              </a:xfrm>
+              <a:prstGeom prst="rect">
+                <a:avLst/>
+              </a:prstGeom>
+              <a:noFill/>
+            </p:spPr>
+            <p:txBody>
+              <a:bodyPr wrap="square" rtlCol="0">
+                <a:spAutoFit/>
+              </a:bodyPr>
+              <a:lstStyle/>
+              <a:p>
+                <a:r>
+                  <a:rPr lang="en-US" sz="1000" dirty="0"/>
+                  <a:t>111</a:t>
+                </a:r>
+              </a:p>
+            </p:txBody>
+          </p:sp>
+          <p:sp>
+            <p:nvSpPr>
+              <p:cNvPr id="8" name="TextBox 7">
+                <a:extLst>
+                  <a:ext uri="{FF2B5EF4-FFF2-40B4-BE49-F238E27FC236}">
+                    <a16:creationId xmlns:a16="http://schemas.microsoft.com/office/drawing/2014/main" id="{B9571238-8363-0F40-9FEA-9A12DAB809CE}"/>
+                  </a:ext>
+                </a:extLst>
+              </p:cNvPr>
+              <p:cNvSpPr txBox="1"/>
+              <p:nvPr/>
+            </p:nvSpPr>
+            <p:spPr>
+              <a:xfrm>
+                <a:off x="4791206" y="1390389"/>
+                <a:ext cx="419622" cy="246221"/>
+              </a:xfrm>
+              <a:prstGeom prst="rect">
+                <a:avLst/>
+              </a:prstGeom>
+              <a:noFill/>
+            </p:spPr>
+            <p:txBody>
+              <a:bodyPr wrap="square" rtlCol="0">
+                <a:spAutoFit/>
+              </a:bodyPr>
+              <a:lstStyle/>
+              <a:p>
+                <a:r>
+                  <a:rPr lang="en-US" sz="1000" dirty="0"/>
+                  <a:t>111</a:t>
+                </a:r>
+              </a:p>
+            </p:txBody>
+          </p:sp>
+          <p:sp>
+            <p:nvSpPr>
+              <p:cNvPr id="9" name="TextBox 8">
+                <a:extLst>
+                  <a:ext uri="{FF2B5EF4-FFF2-40B4-BE49-F238E27FC236}">
+                    <a16:creationId xmlns:a16="http://schemas.microsoft.com/office/drawing/2014/main" id="{8098A3FB-8558-FA40-9456-A320D6B0E3BC}"/>
+                  </a:ext>
+                </a:extLst>
+              </p:cNvPr>
+              <p:cNvSpPr txBox="1"/>
+              <p:nvPr/>
+            </p:nvSpPr>
+            <p:spPr>
+              <a:xfrm>
+                <a:off x="3488499" y="2342367"/>
+                <a:ext cx="419622" cy="246221"/>
+              </a:xfrm>
+              <a:prstGeom prst="rect">
+                <a:avLst/>
+              </a:prstGeom>
+              <a:noFill/>
+            </p:spPr>
+            <p:txBody>
+              <a:bodyPr wrap="square" rtlCol="0">
+                <a:spAutoFit/>
+              </a:bodyPr>
+              <a:lstStyle/>
+              <a:p>
+                <a:r>
+                  <a:rPr lang="en-US" sz="1000" dirty="0"/>
+                  <a:t>110</a:t>
+                </a:r>
+              </a:p>
+            </p:txBody>
+          </p:sp>
+          <p:sp>
+            <p:nvSpPr>
+              <p:cNvPr id="10" name="TextBox 9">
+                <a:extLst>
+                  <a:ext uri="{FF2B5EF4-FFF2-40B4-BE49-F238E27FC236}">
+                    <a16:creationId xmlns:a16="http://schemas.microsoft.com/office/drawing/2014/main" id="{BEB68909-F55A-EB46-8B2B-8F31B49AFF38}"/>
+                  </a:ext>
+                </a:extLst>
+              </p:cNvPr>
+              <p:cNvSpPr txBox="1"/>
+              <p:nvPr/>
+            </p:nvSpPr>
+            <p:spPr>
+              <a:xfrm>
+                <a:off x="4052171" y="2373682"/>
+                <a:ext cx="419622" cy="246221"/>
+              </a:xfrm>
+              <a:prstGeom prst="rect">
+                <a:avLst/>
+              </a:prstGeom>
+              <a:noFill/>
+            </p:spPr>
+            <p:txBody>
+              <a:bodyPr wrap="square" rtlCol="0">
+                <a:spAutoFit/>
+              </a:bodyPr>
+              <a:lstStyle/>
+              <a:p>
+                <a:r>
+                  <a:rPr lang="en-US" sz="1000" dirty="0"/>
+                  <a:t>011</a:t>
+                </a:r>
+              </a:p>
+            </p:txBody>
+          </p:sp>
+          <p:sp>
+            <p:nvSpPr>
+              <p:cNvPr id="11" name="TextBox 10">
+                <a:extLst>
+                  <a:ext uri="{FF2B5EF4-FFF2-40B4-BE49-F238E27FC236}">
+                    <a16:creationId xmlns:a16="http://schemas.microsoft.com/office/drawing/2014/main" id="{3E83BEA0-AE6C-454B-899D-031384CE4CBA}"/>
+                  </a:ext>
+                </a:extLst>
+              </p:cNvPr>
+              <p:cNvSpPr txBox="1"/>
+              <p:nvPr/>
+            </p:nvSpPr>
+            <p:spPr>
+              <a:xfrm>
+                <a:off x="4409162" y="2762754"/>
+                <a:ext cx="419622" cy="246221"/>
+              </a:xfrm>
+              <a:prstGeom prst="rect">
+                <a:avLst/>
+              </a:prstGeom>
+              <a:noFill/>
+            </p:spPr>
+            <p:txBody>
+              <a:bodyPr wrap="square" rtlCol="0">
+                <a:spAutoFit/>
+              </a:bodyPr>
+              <a:lstStyle/>
+              <a:p>
+                <a:r>
+                  <a:rPr lang="en-US" sz="1000" dirty="0"/>
+                  <a:t>010</a:t>
+                </a:r>
+              </a:p>
+            </p:txBody>
+          </p:sp>
+          <p:sp>
+            <p:nvSpPr>
+              <p:cNvPr id="12" name="TextBox 11">
+                <a:extLst>
+                  <a:ext uri="{FF2B5EF4-FFF2-40B4-BE49-F238E27FC236}">
+                    <a16:creationId xmlns:a16="http://schemas.microsoft.com/office/drawing/2014/main" id="{D91F58E5-0C40-D94A-9938-B993F6A93E64}"/>
+                  </a:ext>
+                </a:extLst>
+              </p:cNvPr>
+              <p:cNvSpPr txBox="1"/>
+              <p:nvPr/>
+            </p:nvSpPr>
+            <p:spPr>
+              <a:xfrm>
+                <a:off x="5073041" y="2445511"/>
+                <a:ext cx="419622" cy="246221"/>
+              </a:xfrm>
+              <a:prstGeom prst="rect">
+                <a:avLst/>
+              </a:prstGeom>
+              <a:noFill/>
+            </p:spPr>
+            <p:txBody>
+              <a:bodyPr wrap="square" rtlCol="0">
+                <a:spAutoFit/>
+              </a:bodyPr>
+              <a:lstStyle/>
+              <a:p>
+                <a:r>
+                  <a:rPr lang="en-US" sz="1000" dirty="0"/>
+                  <a:t>101</a:t>
+                </a:r>
+              </a:p>
+            </p:txBody>
+          </p:sp>
+          <p:sp>
+            <p:nvSpPr>
+              <p:cNvPr id="34" name="TextBox 33">
+                <a:extLst>
+                  <a:ext uri="{FF2B5EF4-FFF2-40B4-BE49-F238E27FC236}">
+                    <a16:creationId xmlns:a16="http://schemas.microsoft.com/office/drawing/2014/main" id="{8039BE2B-66C3-704B-92A1-B3D618F2D633}"/>
+                  </a:ext>
+                </a:extLst>
+              </p:cNvPr>
+              <p:cNvSpPr txBox="1"/>
+              <p:nvPr/>
+            </p:nvSpPr>
+            <p:spPr>
+              <a:xfrm>
+                <a:off x="5075835" y="2611439"/>
+                <a:ext cx="419622" cy="246221"/>
+              </a:xfrm>
+              <a:prstGeom prst="rect">
+                <a:avLst/>
+              </a:prstGeom>
+              <a:noFill/>
+            </p:spPr>
+            <p:txBody>
+              <a:bodyPr wrap="square" rtlCol="0">
+                <a:spAutoFit/>
+              </a:bodyPr>
+              <a:lstStyle/>
+              <a:p>
+                <a:r>
+                  <a:rPr lang="en-US" sz="1000" dirty="0"/>
+                  <a:t>001</a:t>
+                </a:r>
+              </a:p>
+            </p:txBody>
+          </p:sp>
+          <p:sp>
+            <p:nvSpPr>
+              <p:cNvPr id="35" name="TextBox 34">
+                <a:extLst>
+                  <a:ext uri="{FF2B5EF4-FFF2-40B4-BE49-F238E27FC236}">
+                    <a16:creationId xmlns:a16="http://schemas.microsoft.com/office/drawing/2014/main" id="{97F467FF-2E35-0743-8267-26E3CA1447A4}"/>
+                  </a:ext>
+                </a:extLst>
+              </p:cNvPr>
+              <p:cNvSpPr txBox="1"/>
+              <p:nvPr/>
+            </p:nvSpPr>
+            <p:spPr>
+              <a:xfrm>
+                <a:off x="5073041" y="2734550"/>
+                <a:ext cx="419622" cy="246221"/>
+              </a:xfrm>
+              <a:prstGeom prst="rect">
+                <a:avLst/>
+              </a:prstGeom>
+              <a:noFill/>
+            </p:spPr>
+            <p:txBody>
+              <a:bodyPr wrap="square" rtlCol="0">
+                <a:spAutoFit/>
+              </a:bodyPr>
+              <a:lstStyle/>
+              <a:p>
+                <a:r>
+                  <a:rPr lang="en-US" sz="1000" dirty="0"/>
+                  <a:t>100</a:t>
+                </a:r>
+              </a:p>
+            </p:txBody>
+          </p:sp>
+          <p:sp>
+            <p:nvSpPr>
+              <p:cNvPr id="59" name="TextBox 58">
+                <a:extLst>
+                  <a:ext uri="{FF2B5EF4-FFF2-40B4-BE49-F238E27FC236}">
+                    <a16:creationId xmlns:a16="http://schemas.microsoft.com/office/drawing/2014/main" id="{3F4BB779-F8FC-DC45-842D-9492970E5234}"/>
+                  </a:ext>
+                </a:extLst>
+              </p:cNvPr>
+              <p:cNvSpPr txBox="1"/>
+              <p:nvPr/>
+            </p:nvSpPr>
+            <p:spPr>
+              <a:xfrm>
+                <a:off x="3229988" y="-1047605"/>
+                <a:ext cx="419622" cy="249172"/>
+              </a:xfrm>
+              <a:prstGeom prst="rect">
+                <a:avLst/>
+              </a:prstGeom>
+              <a:noFill/>
+            </p:spPr>
+            <p:txBody>
+              <a:bodyPr wrap="square" rtlCol="0">
+                <a:spAutoFit/>
+              </a:bodyPr>
+              <a:lstStyle/>
+              <a:p>
+                <a:r>
+                  <a:rPr lang="en-US" sz="1000" dirty="0"/>
+                  <a:t>1</a:t>
+                </a:r>
+              </a:p>
+            </p:txBody>
+          </p:sp>
+          <p:sp>
+            <p:nvSpPr>
+              <p:cNvPr id="60" name="TextBox 59">
+                <a:extLst>
+                  <a:ext uri="{FF2B5EF4-FFF2-40B4-BE49-F238E27FC236}">
+                    <a16:creationId xmlns:a16="http://schemas.microsoft.com/office/drawing/2014/main" id="{AC114EB4-3D63-9E41-ADE1-DE35BF22DDCB}"/>
+                  </a:ext>
+                </a:extLst>
+              </p:cNvPr>
+              <p:cNvSpPr txBox="1"/>
+              <p:nvPr/>
+            </p:nvSpPr>
+            <p:spPr>
+              <a:xfrm>
+                <a:off x="4672533" y="117068"/>
+                <a:ext cx="419622" cy="249172"/>
+              </a:xfrm>
+              <a:prstGeom prst="rect">
+                <a:avLst/>
+              </a:prstGeom>
+              <a:noFill/>
+            </p:spPr>
+            <p:txBody>
+              <a:bodyPr wrap="square" rtlCol="0">
+                <a:spAutoFit/>
+              </a:bodyPr>
+              <a:lstStyle/>
+              <a:p>
+                <a:r>
+                  <a:rPr lang="en-US" sz="1000" dirty="0"/>
+                  <a:t>0</a:t>
+                </a:r>
+              </a:p>
+            </p:txBody>
+          </p:sp>
+        </p:grpSp>
+        <p:grpSp>
+          <p:nvGrpSpPr>
+            <p:cNvPr id="36" name="Group 35">
+              <a:extLst>
+                <a:ext uri="{FF2B5EF4-FFF2-40B4-BE49-F238E27FC236}">
+                  <a16:creationId xmlns:a16="http://schemas.microsoft.com/office/drawing/2014/main" id="{210C8737-D90B-DE47-B024-21FB055C0FDE}"/>
+                </a:ext>
+              </a:extLst>
+            </p:cNvPr>
+            <p:cNvGrpSpPr/>
+            <p:nvPr/>
+          </p:nvGrpSpPr>
+          <p:grpSpPr>
+            <a:xfrm>
+              <a:off x="4232317" y="115961"/>
+              <a:ext cx="3799670" cy="2539478"/>
+              <a:chOff x="3876804" y="115961"/>
+              <a:chExt cx="3799670" cy="2539478"/>
+            </a:xfrm>
+          </p:grpSpPr>
+          <p:pic>
+            <p:nvPicPr>
+              <p:cNvPr id="24" name="Picture 23">
+                <a:extLst>
+                  <a:ext uri="{FF2B5EF4-FFF2-40B4-BE49-F238E27FC236}">
+                    <a16:creationId xmlns:a16="http://schemas.microsoft.com/office/drawing/2014/main" id="{08233572-A0F2-8743-9DB1-96E101292EF0}"/>
+                  </a:ext>
+                </a:extLst>
+              </p:cNvPr>
+              <p:cNvPicPr>
+                <a:picLocks noChangeAspect="1"/>
+              </p:cNvPicPr>
+              <p:nvPr/>
+            </p:nvPicPr>
+            <p:blipFill>
+              <a:blip r:embed="rId5"/>
+              <a:stretch>
+                <a:fillRect/>
+              </a:stretch>
+            </p:blipFill>
+            <p:spPr>
+              <a:xfrm>
+                <a:off x="3876804" y="115961"/>
+                <a:ext cx="3799670" cy="2539478"/>
+              </a:xfrm>
+              <a:prstGeom prst="rect">
+                <a:avLst/>
+              </a:prstGeom>
+            </p:spPr>
+          </p:pic>
+          <p:sp>
+            <p:nvSpPr>
+              <p:cNvPr id="19" name="TextBox 18">
+                <a:extLst>
+                  <a:ext uri="{FF2B5EF4-FFF2-40B4-BE49-F238E27FC236}">
+                    <a16:creationId xmlns:a16="http://schemas.microsoft.com/office/drawing/2014/main" id="{A292C7A8-2A2A-8348-8B38-17BD7C316D3E}"/>
+                  </a:ext>
+                </a:extLst>
+              </p:cNvPr>
+              <p:cNvSpPr txBox="1"/>
+              <p:nvPr/>
+            </p:nvSpPr>
+            <p:spPr>
+              <a:xfrm>
+                <a:off x="4771339" y="617002"/>
+                <a:ext cx="502193" cy="246221"/>
+              </a:xfrm>
+              <a:prstGeom prst="rect">
+                <a:avLst/>
+              </a:prstGeom>
+              <a:noFill/>
+            </p:spPr>
+            <p:txBody>
+              <a:bodyPr wrap="square" rtlCol="0">
+                <a:spAutoFit/>
+              </a:bodyPr>
+              <a:lstStyle/>
+              <a:p>
+                <a:r>
+                  <a:rPr lang="en-US" sz="1000" dirty="0"/>
+                  <a:t>1111</a:t>
+                </a:r>
+              </a:p>
+            </p:txBody>
+          </p:sp>
+          <p:sp>
+            <p:nvSpPr>
+              <p:cNvPr id="20" name="TextBox 19">
+                <a:extLst>
+                  <a:ext uri="{FF2B5EF4-FFF2-40B4-BE49-F238E27FC236}">
+                    <a16:creationId xmlns:a16="http://schemas.microsoft.com/office/drawing/2014/main" id="{8E342053-9025-5044-9E36-E71EE8A87845}"/>
+                  </a:ext>
+                </a:extLst>
+              </p:cNvPr>
+              <p:cNvSpPr txBox="1"/>
+              <p:nvPr/>
+            </p:nvSpPr>
+            <p:spPr>
+              <a:xfrm>
+                <a:off x="5874457" y="147950"/>
+                <a:ext cx="502193" cy="246221"/>
+              </a:xfrm>
+              <a:prstGeom prst="rect">
+                <a:avLst/>
+              </a:prstGeom>
+              <a:noFill/>
+            </p:spPr>
+            <p:txBody>
+              <a:bodyPr wrap="square" rtlCol="0">
+                <a:spAutoFit/>
+              </a:bodyPr>
+              <a:lstStyle/>
+              <a:p>
+                <a:r>
+                  <a:rPr lang="en-US" sz="1000" dirty="0"/>
+                  <a:t>1111</a:t>
+                </a:r>
+              </a:p>
+            </p:txBody>
+          </p:sp>
+          <p:sp>
+            <p:nvSpPr>
+              <p:cNvPr id="21" name="TextBox 20">
+                <a:extLst>
+                  <a:ext uri="{FF2B5EF4-FFF2-40B4-BE49-F238E27FC236}">
+                    <a16:creationId xmlns:a16="http://schemas.microsoft.com/office/drawing/2014/main" id="{BD2AEB8C-85A8-1748-B822-4641CF9BD364}"/>
+                  </a:ext>
+                </a:extLst>
+              </p:cNvPr>
+              <p:cNvSpPr txBox="1"/>
+              <p:nvPr/>
+            </p:nvSpPr>
+            <p:spPr>
+              <a:xfrm>
+                <a:off x="5325366" y="604475"/>
+                <a:ext cx="502193" cy="246221"/>
+              </a:xfrm>
+              <a:prstGeom prst="rect">
+                <a:avLst/>
+              </a:prstGeom>
+              <a:noFill/>
+            </p:spPr>
+            <p:txBody>
+              <a:bodyPr wrap="square" rtlCol="0">
+                <a:spAutoFit/>
+              </a:bodyPr>
+              <a:lstStyle/>
+              <a:p>
+                <a:r>
+                  <a:rPr lang="en-US" sz="1000" dirty="0"/>
+                  <a:t>1110</a:t>
+                </a:r>
+              </a:p>
+            </p:txBody>
+          </p:sp>
+          <p:sp>
+            <p:nvSpPr>
+              <p:cNvPr id="22" name="TextBox 21">
+                <a:extLst>
+                  <a:ext uri="{FF2B5EF4-FFF2-40B4-BE49-F238E27FC236}">
+                    <a16:creationId xmlns:a16="http://schemas.microsoft.com/office/drawing/2014/main" id="{860B7FF2-F80D-E847-A4E3-3E9FCCD8C4C8}"/>
+                  </a:ext>
+                </a:extLst>
+              </p:cNvPr>
+              <p:cNvSpPr txBox="1"/>
+              <p:nvPr/>
+            </p:nvSpPr>
+            <p:spPr>
+              <a:xfrm>
+                <a:off x="6199182" y="1007106"/>
+                <a:ext cx="502193" cy="246221"/>
+              </a:xfrm>
+              <a:prstGeom prst="rect">
+                <a:avLst/>
+              </a:prstGeom>
+              <a:noFill/>
+            </p:spPr>
+            <p:txBody>
+              <a:bodyPr wrap="square" rtlCol="0">
+                <a:spAutoFit/>
+              </a:bodyPr>
+              <a:lstStyle/>
+              <a:p>
+                <a:r>
+                  <a:rPr lang="en-US" sz="1000" dirty="0"/>
+                  <a:t>1100</a:t>
+                </a:r>
+              </a:p>
+            </p:txBody>
+          </p:sp>
+          <p:sp>
+            <p:nvSpPr>
+              <p:cNvPr id="23" name="TextBox 22">
+                <a:extLst>
+                  <a:ext uri="{FF2B5EF4-FFF2-40B4-BE49-F238E27FC236}">
+                    <a16:creationId xmlns:a16="http://schemas.microsoft.com/office/drawing/2014/main" id="{123BDF7A-5546-C843-A85D-282E95F6DFCF}"/>
+                  </a:ext>
+                </a:extLst>
+              </p:cNvPr>
+              <p:cNvSpPr txBox="1"/>
+              <p:nvPr/>
+            </p:nvSpPr>
+            <p:spPr>
+              <a:xfrm>
+                <a:off x="6806317" y="850696"/>
+                <a:ext cx="502193" cy="246221"/>
+              </a:xfrm>
+              <a:prstGeom prst="rect">
+                <a:avLst/>
+              </a:prstGeom>
+              <a:noFill/>
+            </p:spPr>
+            <p:txBody>
+              <a:bodyPr wrap="square" rtlCol="0">
+                <a:spAutoFit/>
+              </a:bodyPr>
+              <a:lstStyle/>
+              <a:p>
+                <a:r>
+                  <a:rPr lang="en-US" sz="1000" dirty="0"/>
+                  <a:t>1011</a:t>
+                </a:r>
+              </a:p>
+            </p:txBody>
+          </p:sp>
+          <p:sp>
+            <p:nvSpPr>
+              <p:cNvPr id="25" name="TextBox 24">
+                <a:extLst>
+                  <a:ext uri="{FF2B5EF4-FFF2-40B4-BE49-F238E27FC236}">
+                    <a16:creationId xmlns:a16="http://schemas.microsoft.com/office/drawing/2014/main" id="{A59D445A-809B-AA45-93DF-CC997E7B65B1}"/>
+                  </a:ext>
+                </a:extLst>
+              </p:cNvPr>
+              <p:cNvSpPr txBox="1"/>
+              <p:nvPr/>
+            </p:nvSpPr>
+            <p:spPr>
+              <a:xfrm>
+                <a:off x="5628296" y="657641"/>
+                <a:ext cx="502193" cy="246221"/>
+              </a:xfrm>
+              <a:prstGeom prst="rect">
+                <a:avLst/>
+              </a:prstGeom>
+              <a:noFill/>
+            </p:spPr>
+            <p:txBody>
+              <a:bodyPr wrap="square" rtlCol="0">
+                <a:spAutoFit/>
+              </a:bodyPr>
+              <a:lstStyle/>
+              <a:p>
+                <a:r>
+                  <a:rPr lang="en-US" sz="1000" dirty="0"/>
+                  <a:t>1101</a:t>
+                </a:r>
+              </a:p>
+            </p:txBody>
+          </p:sp>
+          <p:sp>
+            <p:nvSpPr>
+              <p:cNvPr id="26" name="TextBox 25">
+                <a:extLst>
+                  <a:ext uri="{FF2B5EF4-FFF2-40B4-BE49-F238E27FC236}">
+                    <a16:creationId xmlns:a16="http://schemas.microsoft.com/office/drawing/2014/main" id="{A9B10641-E74C-7940-9DE7-236A82626F67}"/>
+                  </a:ext>
+                </a:extLst>
+              </p:cNvPr>
+              <p:cNvSpPr txBox="1"/>
+              <p:nvPr/>
+            </p:nvSpPr>
+            <p:spPr>
+              <a:xfrm>
+                <a:off x="6538337" y="235633"/>
+                <a:ext cx="502193" cy="246221"/>
+              </a:xfrm>
+              <a:prstGeom prst="rect">
+                <a:avLst/>
+              </a:prstGeom>
+              <a:noFill/>
+            </p:spPr>
+            <p:txBody>
+              <a:bodyPr wrap="square" rtlCol="0">
+                <a:spAutoFit/>
+              </a:bodyPr>
+              <a:lstStyle/>
+              <a:p>
+                <a:r>
+                  <a:rPr lang="en-US" sz="1000" dirty="0"/>
+                  <a:t>1111</a:t>
+                </a:r>
+              </a:p>
+            </p:txBody>
+          </p:sp>
+          <p:sp>
+            <p:nvSpPr>
+              <p:cNvPr id="27" name="TextBox 26">
+                <a:extLst>
+                  <a:ext uri="{FF2B5EF4-FFF2-40B4-BE49-F238E27FC236}">
+                    <a16:creationId xmlns:a16="http://schemas.microsoft.com/office/drawing/2014/main" id="{D0F4C458-4B93-5C46-A6AA-88B3128478F8}"/>
+                  </a:ext>
+                </a:extLst>
+              </p:cNvPr>
+              <p:cNvSpPr txBox="1"/>
+              <p:nvPr/>
+            </p:nvSpPr>
+            <p:spPr>
+              <a:xfrm>
+                <a:off x="7119465" y="1784909"/>
+                <a:ext cx="502193" cy="246221"/>
+              </a:xfrm>
+              <a:prstGeom prst="rect">
+                <a:avLst/>
+              </a:prstGeom>
+              <a:noFill/>
+            </p:spPr>
+            <p:txBody>
+              <a:bodyPr wrap="square" rtlCol="0">
+                <a:spAutoFit/>
+              </a:bodyPr>
+              <a:lstStyle/>
+              <a:p>
+                <a:r>
+                  <a:rPr lang="en-US" sz="1000" dirty="0"/>
+                  <a:t>1001</a:t>
+                </a:r>
+              </a:p>
+            </p:txBody>
+          </p:sp>
+          <p:sp>
+            <p:nvSpPr>
+              <p:cNvPr id="28" name="TextBox 27">
+                <a:extLst>
+                  <a:ext uri="{FF2B5EF4-FFF2-40B4-BE49-F238E27FC236}">
+                    <a16:creationId xmlns:a16="http://schemas.microsoft.com/office/drawing/2014/main" id="{04A165EB-E559-0649-A38A-AD6DB5E89522}"/>
+                  </a:ext>
+                </a:extLst>
+              </p:cNvPr>
+              <p:cNvSpPr txBox="1"/>
+              <p:nvPr/>
+            </p:nvSpPr>
+            <p:spPr>
+              <a:xfrm>
+                <a:off x="7119924" y="1903497"/>
+                <a:ext cx="502193" cy="246221"/>
+              </a:xfrm>
+              <a:prstGeom prst="rect">
+                <a:avLst/>
+              </a:prstGeom>
+              <a:noFill/>
+            </p:spPr>
+            <p:txBody>
+              <a:bodyPr wrap="square" rtlCol="0">
+                <a:spAutoFit/>
+              </a:bodyPr>
+              <a:lstStyle/>
+              <a:p>
+                <a:r>
+                  <a:rPr lang="en-US" sz="1000" dirty="0"/>
+                  <a:t>1010</a:t>
+                </a:r>
+              </a:p>
+            </p:txBody>
+          </p:sp>
+          <p:sp>
+            <p:nvSpPr>
+              <p:cNvPr id="29" name="TextBox 28">
+                <a:extLst>
+                  <a:ext uri="{FF2B5EF4-FFF2-40B4-BE49-F238E27FC236}">
+                    <a16:creationId xmlns:a16="http://schemas.microsoft.com/office/drawing/2014/main" id="{38879314-ADC0-BB40-BBD2-F520760DEF27}"/>
+                  </a:ext>
+                </a:extLst>
+              </p:cNvPr>
+              <p:cNvSpPr txBox="1"/>
+              <p:nvPr/>
+            </p:nvSpPr>
+            <p:spPr>
+              <a:xfrm>
+                <a:off x="7119005" y="1341115"/>
+                <a:ext cx="502193" cy="246221"/>
+              </a:xfrm>
+              <a:prstGeom prst="rect">
+                <a:avLst/>
+              </a:prstGeom>
+              <a:noFill/>
+            </p:spPr>
+            <p:txBody>
+              <a:bodyPr wrap="square" rtlCol="0">
+                <a:spAutoFit/>
+              </a:bodyPr>
+              <a:lstStyle/>
+              <a:p>
+                <a:r>
+                  <a:rPr lang="en-US" sz="1000" dirty="0"/>
+                  <a:t>0111</a:t>
+                </a:r>
+              </a:p>
+            </p:txBody>
+          </p:sp>
+          <p:sp>
+            <p:nvSpPr>
+              <p:cNvPr id="30" name="TextBox 29">
+                <a:extLst>
+                  <a:ext uri="{FF2B5EF4-FFF2-40B4-BE49-F238E27FC236}">
+                    <a16:creationId xmlns:a16="http://schemas.microsoft.com/office/drawing/2014/main" id="{245B1EB0-0734-D943-A407-512D5D5A66B4}"/>
+                  </a:ext>
+                </a:extLst>
+              </p:cNvPr>
+              <p:cNvSpPr txBox="1"/>
+              <p:nvPr/>
+            </p:nvSpPr>
+            <p:spPr>
+              <a:xfrm>
+                <a:off x="7119464" y="1477184"/>
+                <a:ext cx="502193" cy="246221"/>
+              </a:xfrm>
+              <a:prstGeom prst="rect">
+                <a:avLst/>
+              </a:prstGeom>
+              <a:noFill/>
+            </p:spPr>
+            <p:txBody>
+              <a:bodyPr wrap="square" rtlCol="0">
+                <a:spAutoFit/>
+              </a:bodyPr>
+              <a:lstStyle/>
+              <a:p>
+                <a:r>
+                  <a:rPr lang="en-US" sz="1000" dirty="0"/>
+                  <a:t>0110</a:t>
+                </a:r>
+              </a:p>
+            </p:txBody>
+          </p:sp>
+          <p:sp>
+            <p:nvSpPr>
+              <p:cNvPr id="31" name="TextBox 30">
+                <a:extLst>
+                  <a:ext uri="{FF2B5EF4-FFF2-40B4-BE49-F238E27FC236}">
+                    <a16:creationId xmlns:a16="http://schemas.microsoft.com/office/drawing/2014/main" id="{BBA54254-225F-634D-8FEF-956101731418}"/>
+                  </a:ext>
+                </a:extLst>
+              </p:cNvPr>
+              <p:cNvSpPr txBox="1"/>
+              <p:nvPr/>
+            </p:nvSpPr>
+            <p:spPr>
+              <a:xfrm>
+                <a:off x="7119465" y="1571305"/>
+                <a:ext cx="502193" cy="246221"/>
+              </a:xfrm>
+              <a:prstGeom prst="rect">
+                <a:avLst/>
+              </a:prstGeom>
+              <a:noFill/>
+            </p:spPr>
+            <p:txBody>
+              <a:bodyPr wrap="square" rtlCol="0">
+                <a:spAutoFit/>
+              </a:bodyPr>
+              <a:lstStyle/>
+              <a:p>
+                <a:r>
+                  <a:rPr lang="en-US" sz="1000" dirty="0"/>
+                  <a:t>0011</a:t>
+                </a:r>
+              </a:p>
+            </p:txBody>
+          </p:sp>
+          <p:sp>
+            <p:nvSpPr>
+              <p:cNvPr id="32" name="TextBox 31">
+                <a:extLst>
+                  <a:ext uri="{FF2B5EF4-FFF2-40B4-BE49-F238E27FC236}">
+                    <a16:creationId xmlns:a16="http://schemas.microsoft.com/office/drawing/2014/main" id="{903048D8-3F4E-ED4A-8608-853182529009}"/>
+                  </a:ext>
+                </a:extLst>
+              </p:cNvPr>
+              <p:cNvSpPr txBox="1"/>
+              <p:nvPr/>
+            </p:nvSpPr>
+            <p:spPr>
+              <a:xfrm>
+                <a:off x="7119005" y="1672125"/>
+                <a:ext cx="502193" cy="246221"/>
+              </a:xfrm>
+              <a:prstGeom prst="rect">
+                <a:avLst/>
+              </a:prstGeom>
+              <a:noFill/>
+            </p:spPr>
+            <p:txBody>
+              <a:bodyPr wrap="square" rtlCol="0">
+                <a:spAutoFit/>
+              </a:bodyPr>
+              <a:lstStyle/>
+              <a:p>
+                <a:r>
+                  <a:rPr lang="en-US" sz="1000" dirty="0"/>
+                  <a:t>0101</a:t>
+                </a:r>
+              </a:p>
+            </p:txBody>
+          </p:sp>
+        </p:grpSp>
+        <p:sp>
+          <p:nvSpPr>
+            <p:cNvPr id="39" name="TextBox 38">
+              <a:extLst>
+                <a:ext uri="{FF2B5EF4-FFF2-40B4-BE49-F238E27FC236}">
+                  <a16:creationId xmlns:a16="http://schemas.microsoft.com/office/drawing/2014/main" id="{5F8E2089-E71A-D948-BD44-E48DB8430817}"/>
+                </a:ext>
+              </a:extLst>
+            </p:cNvPr>
+            <p:cNvSpPr txBox="1"/>
+            <p:nvPr/>
+          </p:nvSpPr>
+          <p:spPr>
+            <a:xfrm>
+              <a:off x="5042231" y="2692896"/>
+              <a:ext cx="638648" cy="246221"/>
+            </a:xfrm>
+            <a:prstGeom prst="rect">
+              <a:avLst/>
+            </a:prstGeom>
+            <a:noFill/>
+          </p:spPr>
+          <p:txBody>
+            <a:bodyPr wrap="square" rtlCol="0">
+              <a:spAutoFit/>
+            </a:bodyPr>
+            <a:lstStyle/>
+            <a:p>
+              <a:r>
+                <a:rPr lang="en-US" sz="1000" dirty="0"/>
+                <a:t>111111</a:t>
+              </a:r>
+            </a:p>
+          </p:txBody>
+        </p:sp>
+        <p:sp>
+          <p:nvSpPr>
+            <p:cNvPr id="40" name="TextBox 39">
+              <a:extLst>
+                <a:ext uri="{FF2B5EF4-FFF2-40B4-BE49-F238E27FC236}">
+                  <a16:creationId xmlns:a16="http://schemas.microsoft.com/office/drawing/2014/main" id="{A5BABA40-0EDE-A44A-8A7D-1813CF08526A}"/>
+                </a:ext>
+              </a:extLst>
+            </p:cNvPr>
+            <p:cNvSpPr txBox="1"/>
+            <p:nvPr/>
+          </p:nvSpPr>
+          <p:spPr>
+            <a:xfrm>
+              <a:off x="4990397" y="3518434"/>
+              <a:ext cx="638648" cy="246221"/>
+            </a:xfrm>
+            <a:prstGeom prst="rect">
+              <a:avLst/>
+            </a:prstGeom>
+            <a:noFill/>
+          </p:spPr>
+          <p:txBody>
+            <a:bodyPr wrap="square" rtlCol="0">
+              <a:spAutoFit/>
+            </a:bodyPr>
+            <a:lstStyle/>
+            <a:p>
+              <a:r>
+                <a:rPr lang="en-US" sz="1000" dirty="0"/>
+                <a:t>111110</a:t>
+              </a:r>
+            </a:p>
+          </p:txBody>
+        </p:sp>
+        <p:sp>
+          <p:nvSpPr>
+            <p:cNvPr id="41" name="TextBox 40">
+              <a:extLst>
+                <a:ext uri="{FF2B5EF4-FFF2-40B4-BE49-F238E27FC236}">
+                  <a16:creationId xmlns:a16="http://schemas.microsoft.com/office/drawing/2014/main" id="{FF63771A-6F21-ED41-96D9-94575EB2459C}"/>
+                </a:ext>
+              </a:extLst>
+            </p:cNvPr>
+            <p:cNvSpPr txBox="1"/>
+            <p:nvPr/>
+          </p:nvSpPr>
+          <p:spPr>
+            <a:xfrm>
+              <a:off x="5193959" y="3811938"/>
+              <a:ext cx="638648" cy="246221"/>
+            </a:xfrm>
+            <a:prstGeom prst="rect">
+              <a:avLst/>
+            </a:prstGeom>
+            <a:noFill/>
+          </p:spPr>
+          <p:txBody>
+            <a:bodyPr wrap="square" rtlCol="0">
+              <a:spAutoFit/>
+            </a:bodyPr>
+            <a:lstStyle/>
+            <a:p>
+              <a:r>
+                <a:rPr lang="en-US" sz="1000" dirty="0"/>
+                <a:t>111000</a:t>
+              </a:r>
+            </a:p>
+          </p:txBody>
+        </p:sp>
+        <p:sp>
+          <p:nvSpPr>
+            <p:cNvPr id="42" name="TextBox 41">
+              <a:extLst>
+                <a:ext uri="{FF2B5EF4-FFF2-40B4-BE49-F238E27FC236}">
+                  <a16:creationId xmlns:a16="http://schemas.microsoft.com/office/drawing/2014/main" id="{781EAC61-02AA-0048-9200-40B801DA68C2}"/>
+                </a:ext>
+              </a:extLst>
+            </p:cNvPr>
+            <p:cNvSpPr txBox="1"/>
+            <p:nvPr/>
+          </p:nvSpPr>
+          <p:spPr>
+            <a:xfrm>
+              <a:off x="5063145" y="3668976"/>
+              <a:ext cx="638648" cy="246221"/>
+            </a:xfrm>
+            <a:prstGeom prst="rect">
+              <a:avLst/>
+            </a:prstGeom>
+            <a:noFill/>
+          </p:spPr>
+          <p:txBody>
+            <a:bodyPr wrap="square" rtlCol="0">
+              <a:spAutoFit/>
+            </a:bodyPr>
+            <a:lstStyle/>
+            <a:p>
+              <a:r>
+                <a:rPr lang="en-US" sz="1000" dirty="0"/>
+                <a:t>111100</a:t>
+              </a:r>
+            </a:p>
+          </p:txBody>
+        </p:sp>
+        <p:sp>
+          <p:nvSpPr>
+            <p:cNvPr id="43" name="TextBox 42">
+              <a:extLst>
+                <a:ext uri="{FF2B5EF4-FFF2-40B4-BE49-F238E27FC236}">
+                  <a16:creationId xmlns:a16="http://schemas.microsoft.com/office/drawing/2014/main" id="{D545382B-35EA-A34C-93B4-FCC0D45AE5A2}"/>
+                </a:ext>
+              </a:extLst>
+            </p:cNvPr>
+            <p:cNvSpPr txBox="1"/>
+            <p:nvPr/>
+          </p:nvSpPr>
+          <p:spPr>
+            <a:xfrm>
+              <a:off x="5521408" y="2765082"/>
+              <a:ext cx="638648" cy="246221"/>
+            </a:xfrm>
+            <a:prstGeom prst="rect">
+              <a:avLst/>
+            </a:prstGeom>
+            <a:noFill/>
+          </p:spPr>
+          <p:txBody>
+            <a:bodyPr wrap="square" rtlCol="0">
+              <a:spAutoFit/>
+            </a:bodyPr>
+            <a:lstStyle/>
+            <a:p>
+              <a:r>
+                <a:rPr lang="en-US" sz="1000" dirty="0"/>
+                <a:t>111111</a:t>
+              </a:r>
+            </a:p>
+          </p:txBody>
+        </p:sp>
+        <p:sp>
+          <p:nvSpPr>
+            <p:cNvPr id="44" name="TextBox 43">
+              <a:extLst>
+                <a:ext uri="{FF2B5EF4-FFF2-40B4-BE49-F238E27FC236}">
+                  <a16:creationId xmlns:a16="http://schemas.microsoft.com/office/drawing/2014/main" id="{20431138-A8CC-CF46-BB83-FC4243059661}"/>
+                </a:ext>
+              </a:extLst>
+            </p:cNvPr>
+            <p:cNvSpPr txBox="1"/>
+            <p:nvPr/>
+          </p:nvSpPr>
+          <p:spPr>
+            <a:xfrm>
+              <a:off x="6170565" y="2764041"/>
+              <a:ext cx="638648" cy="246221"/>
+            </a:xfrm>
+            <a:prstGeom prst="rect">
+              <a:avLst/>
+            </a:prstGeom>
+            <a:noFill/>
+          </p:spPr>
+          <p:txBody>
+            <a:bodyPr wrap="square" rtlCol="0">
+              <a:spAutoFit/>
+            </a:bodyPr>
+            <a:lstStyle/>
+            <a:p>
+              <a:r>
+                <a:rPr lang="en-US" sz="1000" dirty="0"/>
+                <a:t>111111</a:t>
+              </a:r>
+            </a:p>
+          </p:txBody>
+        </p:sp>
+        <p:sp>
+          <p:nvSpPr>
+            <p:cNvPr id="45" name="TextBox 44">
+              <a:extLst>
+                <a:ext uri="{FF2B5EF4-FFF2-40B4-BE49-F238E27FC236}">
+                  <a16:creationId xmlns:a16="http://schemas.microsoft.com/office/drawing/2014/main" id="{7636C055-3AD0-8248-9987-73F9A0088B8A}"/>
+                </a:ext>
+              </a:extLst>
+            </p:cNvPr>
+            <p:cNvSpPr txBox="1"/>
+            <p:nvPr/>
+          </p:nvSpPr>
+          <p:spPr>
+            <a:xfrm>
+              <a:off x="5603508" y="3915197"/>
+              <a:ext cx="638648" cy="246221"/>
+            </a:xfrm>
+            <a:prstGeom prst="rect">
+              <a:avLst/>
+            </a:prstGeom>
+            <a:noFill/>
+          </p:spPr>
+          <p:txBody>
+            <a:bodyPr wrap="square" rtlCol="0">
+              <a:spAutoFit/>
+            </a:bodyPr>
+            <a:lstStyle/>
+            <a:p>
+              <a:r>
+                <a:rPr lang="en-US" sz="1000" dirty="0"/>
+                <a:t>011111</a:t>
+              </a:r>
+            </a:p>
+          </p:txBody>
+        </p:sp>
+        <p:sp>
+          <p:nvSpPr>
+            <p:cNvPr id="46" name="TextBox 45">
+              <a:extLst>
+                <a:ext uri="{FF2B5EF4-FFF2-40B4-BE49-F238E27FC236}">
+                  <a16:creationId xmlns:a16="http://schemas.microsoft.com/office/drawing/2014/main" id="{FE6D3734-54DE-D04C-B7F5-8BB09C8D3740}"/>
+                </a:ext>
+              </a:extLst>
+            </p:cNvPr>
+            <p:cNvSpPr txBox="1"/>
+            <p:nvPr/>
+          </p:nvSpPr>
+          <p:spPr>
+            <a:xfrm>
+              <a:off x="5886980" y="4399563"/>
+              <a:ext cx="638648" cy="246221"/>
+            </a:xfrm>
+            <a:prstGeom prst="rect">
+              <a:avLst/>
+            </a:prstGeom>
+            <a:noFill/>
+          </p:spPr>
+          <p:txBody>
+            <a:bodyPr wrap="square" rtlCol="0">
+              <a:spAutoFit/>
+            </a:bodyPr>
+            <a:lstStyle/>
+            <a:p>
+              <a:r>
+                <a:rPr lang="en-US" sz="1000" dirty="0"/>
+                <a:t>001111</a:t>
+              </a:r>
+            </a:p>
+          </p:txBody>
+        </p:sp>
+        <p:sp>
+          <p:nvSpPr>
+            <p:cNvPr id="47" name="TextBox 46">
+              <a:extLst>
+                <a:ext uri="{FF2B5EF4-FFF2-40B4-BE49-F238E27FC236}">
+                  <a16:creationId xmlns:a16="http://schemas.microsoft.com/office/drawing/2014/main" id="{438F6DAD-150F-9043-ABF2-E767B0113D62}"/>
+                </a:ext>
+              </a:extLst>
+            </p:cNvPr>
+            <p:cNvSpPr txBox="1"/>
+            <p:nvPr/>
+          </p:nvSpPr>
+          <p:spPr>
+            <a:xfrm>
+              <a:off x="6208834" y="3686504"/>
+              <a:ext cx="638648" cy="246221"/>
+            </a:xfrm>
+            <a:prstGeom prst="rect">
+              <a:avLst/>
+            </a:prstGeom>
+            <a:noFill/>
+          </p:spPr>
+          <p:txBody>
+            <a:bodyPr wrap="square" rtlCol="0">
+              <a:spAutoFit/>
+            </a:bodyPr>
+            <a:lstStyle/>
+            <a:p>
+              <a:r>
+                <a:rPr lang="en-US" sz="1000" dirty="0"/>
+                <a:t>110111</a:t>
+              </a:r>
+            </a:p>
+          </p:txBody>
+        </p:sp>
+        <p:sp>
+          <p:nvSpPr>
+            <p:cNvPr id="48" name="TextBox 47">
+              <a:extLst>
+                <a:ext uri="{FF2B5EF4-FFF2-40B4-BE49-F238E27FC236}">
+                  <a16:creationId xmlns:a16="http://schemas.microsoft.com/office/drawing/2014/main" id="{C61AB9CC-129D-E74F-A6E6-78E96E33E80F}"/>
+                </a:ext>
+              </a:extLst>
+            </p:cNvPr>
+            <p:cNvSpPr txBox="1"/>
+            <p:nvPr/>
+          </p:nvSpPr>
+          <p:spPr>
+            <a:xfrm>
+              <a:off x="6388747" y="3828017"/>
+              <a:ext cx="638648" cy="246221"/>
+            </a:xfrm>
+            <a:prstGeom prst="rect">
+              <a:avLst/>
+            </a:prstGeom>
+            <a:noFill/>
+          </p:spPr>
+          <p:txBody>
+            <a:bodyPr wrap="square" rtlCol="0">
+              <a:spAutoFit/>
+            </a:bodyPr>
+            <a:lstStyle/>
+            <a:p>
+              <a:r>
+                <a:rPr lang="en-US" sz="1000" dirty="0"/>
+                <a:t>110011</a:t>
+              </a:r>
+            </a:p>
+          </p:txBody>
+        </p:sp>
+        <p:sp>
+          <p:nvSpPr>
+            <p:cNvPr id="49" name="TextBox 48">
+              <a:extLst>
+                <a:ext uri="{FF2B5EF4-FFF2-40B4-BE49-F238E27FC236}">
+                  <a16:creationId xmlns:a16="http://schemas.microsoft.com/office/drawing/2014/main" id="{9964517E-F16B-D549-A3F0-B5792FF8C49D}"/>
+                </a:ext>
+              </a:extLst>
+            </p:cNvPr>
+            <p:cNvSpPr txBox="1"/>
+            <p:nvPr/>
+          </p:nvSpPr>
+          <p:spPr>
+            <a:xfrm>
+              <a:off x="6506585" y="3942177"/>
+              <a:ext cx="638648" cy="246221"/>
+            </a:xfrm>
+            <a:prstGeom prst="rect">
+              <a:avLst/>
+            </a:prstGeom>
+            <a:noFill/>
+          </p:spPr>
+          <p:txBody>
+            <a:bodyPr wrap="square" rtlCol="0">
+              <a:spAutoFit/>
+            </a:bodyPr>
+            <a:lstStyle/>
+            <a:p>
+              <a:r>
+                <a:rPr lang="en-US" sz="1000" dirty="0"/>
+                <a:t>110001</a:t>
+              </a:r>
+            </a:p>
+          </p:txBody>
+        </p:sp>
+        <p:sp>
+          <p:nvSpPr>
+            <p:cNvPr id="50" name="TextBox 49">
+              <a:extLst>
+                <a:ext uri="{FF2B5EF4-FFF2-40B4-BE49-F238E27FC236}">
+                  <a16:creationId xmlns:a16="http://schemas.microsoft.com/office/drawing/2014/main" id="{D5F0DBC6-C9D4-5649-A9EF-1A71CB5D798D}"/>
+                </a:ext>
+              </a:extLst>
+            </p:cNvPr>
+            <p:cNvSpPr txBox="1"/>
+            <p:nvPr/>
+          </p:nvSpPr>
+          <p:spPr>
+            <a:xfrm>
+              <a:off x="6624423" y="4074238"/>
+              <a:ext cx="638648" cy="246221"/>
+            </a:xfrm>
+            <a:prstGeom prst="rect">
+              <a:avLst/>
+            </a:prstGeom>
+            <a:noFill/>
+          </p:spPr>
+          <p:txBody>
+            <a:bodyPr wrap="square" rtlCol="0">
+              <a:spAutoFit/>
+            </a:bodyPr>
+            <a:lstStyle/>
+            <a:p>
+              <a:r>
+                <a:rPr lang="en-US" sz="1000" dirty="0"/>
+                <a:t>110000</a:t>
+              </a:r>
+            </a:p>
+          </p:txBody>
+        </p:sp>
+        <p:sp>
+          <p:nvSpPr>
+            <p:cNvPr id="51" name="TextBox 50">
+              <a:extLst>
+                <a:ext uri="{FF2B5EF4-FFF2-40B4-BE49-F238E27FC236}">
+                  <a16:creationId xmlns:a16="http://schemas.microsoft.com/office/drawing/2014/main" id="{1B64C5DF-922B-E54C-B3D7-EED5C01A7CB0}"/>
+                </a:ext>
+              </a:extLst>
+            </p:cNvPr>
+            <p:cNvSpPr txBox="1"/>
+            <p:nvPr/>
+          </p:nvSpPr>
+          <p:spPr>
+            <a:xfrm>
+              <a:off x="6782468" y="4594456"/>
+              <a:ext cx="638648" cy="246221"/>
+            </a:xfrm>
+            <a:prstGeom prst="rect">
+              <a:avLst/>
+            </a:prstGeom>
+            <a:noFill/>
+          </p:spPr>
+          <p:txBody>
+            <a:bodyPr wrap="square" rtlCol="0">
+              <a:spAutoFit/>
+            </a:bodyPr>
+            <a:lstStyle/>
+            <a:p>
+              <a:r>
+                <a:rPr lang="en-US" sz="1000" dirty="0"/>
+                <a:t>010000</a:t>
+              </a:r>
+            </a:p>
+          </p:txBody>
+        </p:sp>
+        <p:sp>
+          <p:nvSpPr>
+            <p:cNvPr id="52" name="TextBox 51">
+              <a:extLst>
+                <a:ext uri="{FF2B5EF4-FFF2-40B4-BE49-F238E27FC236}">
+                  <a16:creationId xmlns:a16="http://schemas.microsoft.com/office/drawing/2014/main" id="{D3751B11-520A-5342-A086-E2C925E01272}"/>
+                </a:ext>
+              </a:extLst>
+            </p:cNvPr>
+            <p:cNvSpPr txBox="1"/>
+            <p:nvPr/>
+          </p:nvSpPr>
+          <p:spPr>
+            <a:xfrm>
+              <a:off x="6975087" y="2980542"/>
+              <a:ext cx="638648" cy="246221"/>
+            </a:xfrm>
+            <a:prstGeom prst="rect">
+              <a:avLst/>
+            </a:prstGeom>
+            <a:noFill/>
+          </p:spPr>
+          <p:txBody>
+            <a:bodyPr wrap="square" rtlCol="0">
+              <a:spAutoFit/>
+            </a:bodyPr>
+            <a:lstStyle/>
+            <a:p>
+              <a:r>
+                <a:rPr lang="en-US" sz="1000" dirty="0"/>
+                <a:t>110000</a:t>
+              </a:r>
+            </a:p>
+          </p:txBody>
+        </p:sp>
+        <p:sp>
+          <p:nvSpPr>
+            <p:cNvPr id="53" name="TextBox 52">
+              <a:extLst>
+                <a:ext uri="{FF2B5EF4-FFF2-40B4-BE49-F238E27FC236}">
+                  <a16:creationId xmlns:a16="http://schemas.microsoft.com/office/drawing/2014/main" id="{A11BA359-A808-DD43-8F7A-A7DA8DE6392A}"/>
+                </a:ext>
+              </a:extLst>
+            </p:cNvPr>
+            <p:cNvSpPr txBox="1"/>
+            <p:nvPr/>
+          </p:nvSpPr>
+          <p:spPr>
+            <a:xfrm>
+              <a:off x="7108632" y="3969203"/>
+              <a:ext cx="638648" cy="246221"/>
+            </a:xfrm>
+            <a:prstGeom prst="rect">
+              <a:avLst/>
+            </a:prstGeom>
+            <a:noFill/>
+          </p:spPr>
+          <p:txBody>
+            <a:bodyPr wrap="square" rtlCol="0">
+              <a:spAutoFit/>
+            </a:bodyPr>
+            <a:lstStyle/>
+            <a:p>
+              <a:r>
+                <a:rPr lang="en-US" sz="1000" dirty="0"/>
+                <a:t>100000</a:t>
+              </a:r>
+            </a:p>
+          </p:txBody>
+        </p:sp>
+        <p:sp>
+          <p:nvSpPr>
+            <p:cNvPr id="54" name="TextBox 53">
+              <a:extLst>
+                <a:ext uri="{FF2B5EF4-FFF2-40B4-BE49-F238E27FC236}">
+                  <a16:creationId xmlns:a16="http://schemas.microsoft.com/office/drawing/2014/main" id="{D4D7E0F6-A153-CC49-A700-9BC45FFAB436}"/>
+                </a:ext>
+              </a:extLst>
+            </p:cNvPr>
+            <p:cNvSpPr txBox="1"/>
+            <p:nvPr/>
+          </p:nvSpPr>
+          <p:spPr>
+            <a:xfrm>
+              <a:off x="7184212" y="4571568"/>
+              <a:ext cx="638648" cy="246221"/>
+            </a:xfrm>
+            <a:prstGeom prst="rect">
+              <a:avLst/>
+            </a:prstGeom>
+            <a:noFill/>
+          </p:spPr>
+          <p:txBody>
+            <a:bodyPr wrap="square" rtlCol="0">
+              <a:spAutoFit/>
+            </a:bodyPr>
+            <a:lstStyle/>
+            <a:p>
+              <a:r>
+                <a:rPr lang="en-US" sz="1000" dirty="0"/>
+                <a:t>000000</a:t>
+              </a:r>
+            </a:p>
+          </p:txBody>
+        </p:sp>
+        <p:sp>
+          <p:nvSpPr>
+            <p:cNvPr id="55" name="TextBox 54">
+              <a:extLst>
+                <a:ext uri="{FF2B5EF4-FFF2-40B4-BE49-F238E27FC236}">
+                  <a16:creationId xmlns:a16="http://schemas.microsoft.com/office/drawing/2014/main" id="{04B2A552-0959-5B4F-80D6-B1B3E8CE25CC}"/>
+                </a:ext>
+              </a:extLst>
+            </p:cNvPr>
+            <p:cNvSpPr txBox="1"/>
+            <p:nvPr/>
+          </p:nvSpPr>
+          <p:spPr>
+            <a:xfrm>
+              <a:off x="7396043" y="2981270"/>
+              <a:ext cx="638648" cy="246221"/>
+            </a:xfrm>
+            <a:prstGeom prst="rect">
+              <a:avLst/>
+            </a:prstGeom>
+            <a:noFill/>
+          </p:spPr>
+          <p:txBody>
+            <a:bodyPr wrap="square" rtlCol="0">
+              <a:spAutoFit/>
+            </a:bodyPr>
+            <a:lstStyle/>
+            <a:p>
+              <a:r>
+                <a:rPr lang="en-US" sz="1000" dirty="0"/>
+                <a:t>110000</a:t>
+              </a:r>
+            </a:p>
+          </p:txBody>
+        </p:sp>
+        <p:sp>
+          <p:nvSpPr>
+            <p:cNvPr id="56" name="TextBox 55">
+              <a:extLst>
+                <a:ext uri="{FF2B5EF4-FFF2-40B4-BE49-F238E27FC236}">
+                  <a16:creationId xmlns:a16="http://schemas.microsoft.com/office/drawing/2014/main" id="{582C10DA-D477-9C48-BFAE-88C0D018E8AE}"/>
+                </a:ext>
+              </a:extLst>
+            </p:cNvPr>
+            <p:cNvSpPr txBox="1"/>
+            <p:nvPr/>
+          </p:nvSpPr>
+          <p:spPr>
+            <a:xfrm>
+              <a:off x="7441052" y="4471345"/>
+              <a:ext cx="638648" cy="246221"/>
+            </a:xfrm>
+            <a:prstGeom prst="rect">
+              <a:avLst/>
+            </a:prstGeom>
+            <a:noFill/>
+          </p:spPr>
+          <p:txBody>
+            <a:bodyPr wrap="square" rtlCol="0">
+              <a:spAutoFit/>
+            </a:bodyPr>
+            <a:lstStyle/>
+            <a:p>
+              <a:r>
+                <a:rPr lang="en-US" sz="1000" dirty="0"/>
+                <a:t>010000</a:t>
+              </a:r>
+            </a:p>
+          </p:txBody>
+        </p:sp>
+        <p:sp>
+          <p:nvSpPr>
+            <p:cNvPr id="61" name="TextBox 60">
+              <a:extLst>
+                <a:ext uri="{FF2B5EF4-FFF2-40B4-BE49-F238E27FC236}">
+                  <a16:creationId xmlns:a16="http://schemas.microsoft.com/office/drawing/2014/main" id="{0EE06A48-87A8-5245-A27C-A9FFDC23F42A}"/>
+                </a:ext>
+              </a:extLst>
+            </p:cNvPr>
+            <p:cNvSpPr txBox="1"/>
+            <p:nvPr/>
+          </p:nvSpPr>
+          <p:spPr>
+            <a:xfrm>
+              <a:off x="17869" y="17147"/>
+              <a:ext cx="409252" cy="369332"/>
+            </a:xfrm>
+            <a:prstGeom prst="rect">
+              <a:avLst/>
+            </a:prstGeom>
+            <a:noFill/>
+          </p:spPr>
+          <p:txBody>
+            <a:bodyPr wrap="square" rtlCol="0">
+              <a:spAutoFit/>
+            </a:bodyPr>
+            <a:lstStyle/>
+            <a:p>
+              <a:r>
+                <a:rPr lang="en-US" dirty="0"/>
+                <a:t>a)</a:t>
+              </a:r>
+            </a:p>
+          </p:txBody>
+        </p:sp>
+        <p:sp>
+          <p:nvSpPr>
+            <p:cNvPr id="62" name="TextBox 61">
+              <a:extLst>
+                <a:ext uri="{FF2B5EF4-FFF2-40B4-BE49-F238E27FC236}">
+                  <a16:creationId xmlns:a16="http://schemas.microsoft.com/office/drawing/2014/main" id="{78C13990-DDA2-0F4F-A205-388F688D9334}"/>
+                </a:ext>
+              </a:extLst>
+            </p:cNvPr>
+            <p:cNvSpPr txBox="1"/>
+            <p:nvPr/>
+          </p:nvSpPr>
+          <p:spPr>
+            <a:xfrm>
+              <a:off x="4094010" y="2579375"/>
+              <a:ext cx="409251" cy="369332"/>
+            </a:xfrm>
+            <a:prstGeom prst="rect">
+              <a:avLst/>
+            </a:prstGeom>
+            <a:noFill/>
+          </p:spPr>
+          <p:txBody>
+            <a:bodyPr wrap="square" rtlCol="0">
+              <a:spAutoFit/>
+            </a:bodyPr>
+            <a:lstStyle/>
+            <a:p>
+              <a:r>
+                <a:rPr lang="en-US" dirty="0"/>
+                <a:t>d)</a:t>
+              </a:r>
+            </a:p>
+          </p:txBody>
+        </p:sp>
+        <p:sp>
+          <p:nvSpPr>
+            <p:cNvPr id="63" name="TextBox 62">
+              <a:extLst>
+                <a:ext uri="{FF2B5EF4-FFF2-40B4-BE49-F238E27FC236}">
+                  <a16:creationId xmlns:a16="http://schemas.microsoft.com/office/drawing/2014/main" id="{6B30057C-09B4-9E4A-9EC4-41AD52E3782F}"/>
+                </a:ext>
+              </a:extLst>
+            </p:cNvPr>
+            <p:cNvSpPr txBox="1"/>
+            <p:nvPr/>
+          </p:nvSpPr>
+          <p:spPr>
+            <a:xfrm>
+              <a:off x="54754" y="2571750"/>
+              <a:ext cx="409253" cy="369332"/>
+            </a:xfrm>
+            <a:prstGeom prst="rect">
+              <a:avLst/>
+            </a:prstGeom>
+            <a:noFill/>
+          </p:spPr>
+          <p:txBody>
+            <a:bodyPr wrap="square" rtlCol="0">
+              <a:spAutoFit/>
+            </a:bodyPr>
+            <a:lstStyle/>
+            <a:p>
+              <a:r>
+                <a:rPr lang="en-US" dirty="0"/>
+                <a:t>b)</a:t>
+              </a:r>
+            </a:p>
+          </p:txBody>
+        </p:sp>
+        <p:sp>
+          <p:nvSpPr>
+            <p:cNvPr id="64" name="TextBox 63">
+              <a:extLst>
+                <a:ext uri="{FF2B5EF4-FFF2-40B4-BE49-F238E27FC236}">
+                  <a16:creationId xmlns:a16="http://schemas.microsoft.com/office/drawing/2014/main" id="{08E4C3E2-95F0-D84B-927B-3C37BC2B13C4}"/>
+                </a:ext>
+              </a:extLst>
+            </p:cNvPr>
+            <p:cNvSpPr txBox="1"/>
+            <p:nvPr/>
+          </p:nvSpPr>
+          <p:spPr>
+            <a:xfrm>
+              <a:off x="4089940" y="24839"/>
+              <a:ext cx="409252" cy="369332"/>
+            </a:xfrm>
+            <a:prstGeom prst="rect">
+              <a:avLst/>
+            </a:prstGeom>
+            <a:noFill/>
+          </p:spPr>
+          <p:txBody>
+            <a:bodyPr wrap="square" rtlCol="0">
+              <a:spAutoFit/>
+            </a:bodyPr>
+            <a:lstStyle/>
+            <a:p>
+              <a:r>
+                <a:rPr lang="en-US" dirty="0"/>
+                <a:t>c)</a:t>
+              </a:r>
+            </a:p>
+          </p:txBody>
+        </p:sp>
+      </p:grpSp>
+    </p:spTree>
+    <p:extLst>
+      <p:ext uri="{BB962C8B-B14F-4D97-AF65-F5344CB8AC3E}">
+        <p14:creationId xmlns:p14="http://schemas.microsoft.com/office/powerpoint/2010/main" val="3323188009"/>
+      </p:ext>
+    </p:extLst>
+  </p:cSld>
+  <p:clrMapOvr>
+    <a:masterClrMapping/>
+  </p:clrMapOvr>
+</p:sld>
+</file>
+
+<file path=ppt/slides/slide4.xml><?xml version="1.0" encoding="utf-8"?>
+<p:sld xmlns:a="http://schemas.openxmlformats.org/drawingml/2006/main" xmlns:r="http://schemas.openxmlformats.org/officeDocument/2006/relationships" xmlns:p="http://schemas.openxmlformats.org/presentationml/2006/main">
+  <p:cSld>
     <p:spTree>
       <p:nvGrpSpPr>
         <p:cNvPr id="1" name=""/>
@@ -3550,83 +5909,7 @@
     </p:spTree>
     <p:extLst>
       <p:ext uri="{BB962C8B-B14F-4D97-AF65-F5344CB8AC3E}">
-        <p14:creationId xmlns:p14="http://schemas.microsoft.com/office/powerpoint/2010/main" val="4218174848"/>
-      </p:ext>
-    </p:extLst>
-  </p:cSld>
-  <p:clrMapOvr>
-    <a:masterClrMapping/>
-  </p:clrMapOvr>
-</p:sld>
-</file>
-
-<file path=ppt/slides/slide4.xml><?xml version="1.0" encoding="utf-8"?>
-<p:sld xmlns:a="http://schemas.openxmlformats.org/drawingml/2006/main" xmlns:r="http://schemas.openxmlformats.org/officeDocument/2006/relationships" xmlns:p="http://schemas.openxmlformats.org/presentationml/2006/main">
-  <p:cSld>
-    <p:bg>
-      <p:bgPr>
-        <a:solidFill>
-          <a:schemeClr val="tx1"/>
-        </a:solidFill>
-        <a:effectLst/>
-      </p:bgPr>
-    </p:bg>
-    <p:spTree>
-      <p:nvGrpSpPr>
-        <p:cNvPr id="1" name=""/>
-        <p:cNvGrpSpPr/>
-        <p:nvPr/>
-      </p:nvGrpSpPr>
-      <p:grpSpPr>
-        <a:xfrm>
-          <a:off x="0" y="0"/>
-          <a:ext cx="0" cy="0"/>
-          <a:chOff x="0" y="0"/>
-          <a:chExt cx="0" cy="0"/>
-        </a:xfrm>
-      </p:grpSpPr>
-    </p:spTree>
-    <p:extLst>
-      <p:ext uri="{BB962C8B-B14F-4D97-AF65-F5344CB8AC3E}">
-        <p14:creationId xmlns:p14="http://schemas.microsoft.com/office/powerpoint/2010/main" val="647449236"/>
-      </p:ext>
-    </p:extLst>
-  </p:cSld>
-  <p:clrMapOvr>
-    <a:masterClrMapping/>
-  </p:clrMapOvr>
-</p:sld>
-</file>
-
-<file path=ppt/slides/slide5.xml><?xml version="1.0" encoding="utf-8"?>
-<p:sld xmlns:a="http://schemas.openxmlformats.org/drawingml/2006/main" xmlns:r="http://schemas.openxmlformats.org/officeDocument/2006/relationships" xmlns:p="http://schemas.openxmlformats.org/presentationml/2006/main">
-  <p:cSld>
-    <p:bg>
-      <p:bgPr>
-        <a:solidFill>
-          <a:schemeClr val="tx1"/>
-        </a:solidFill>
-        <a:effectLst/>
-      </p:bgPr>
-    </p:bg>
-    <p:spTree>
-      <p:nvGrpSpPr>
-        <p:cNvPr id="1" name=""/>
-        <p:cNvGrpSpPr/>
-        <p:nvPr/>
-      </p:nvGrpSpPr>
-      <p:grpSpPr>
-        <a:xfrm>
-          <a:off x="0" y="0"/>
-          <a:ext cx="0" cy="0"/>
-          <a:chOff x="0" y="0"/>
-          <a:chExt cx="0" cy="0"/>
-        </a:xfrm>
-      </p:grpSpPr>
-    </p:spTree>
-    <p:extLst>
-      <p:ext uri="{BB962C8B-B14F-4D97-AF65-F5344CB8AC3E}">
-        <p14:creationId xmlns:p14="http://schemas.microsoft.com/office/powerpoint/2010/main" val="2000392589"/>
+        <p14:creationId xmlns:p14="http://schemas.microsoft.com/office/powerpoint/2010/main" val="2918600642"/>
       </p:ext>
     </p:extLst>
   </p:cSld>

</xml_diff>

<commit_message>
Merged documents and edited to version 11j . Note that images and figure captions could not be copied between word files because of the macro structure of LNCS. They were reconstructed.
</commit_message>
<xml_diff>
--- a/fastgenegol/genelifepy/images/Figure_assembly.pptx
+++ b/fastgenegol/genelifepy/images/Figure_assembly.pptx
@@ -246,7 +246,7 @@
           <a:p>
             <a:fld id="{984BAFA8-0F6B-6148-A016-70C3358F5695}" type="datetimeFigureOut">
               <a:rPr lang="en-US" smtClean="0"/>
-              <a:t>9/26/19</a:t>
+              <a:t>9/27/19</a:t>
             </a:fld>
             <a:endParaRPr lang="en-US"/>
           </a:p>
@@ -416,7 +416,7 @@
           <a:p>
             <a:fld id="{984BAFA8-0F6B-6148-A016-70C3358F5695}" type="datetimeFigureOut">
               <a:rPr lang="en-US" smtClean="0"/>
-              <a:t>9/26/19</a:t>
+              <a:t>9/27/19</a:t>
             </a:fld>
             <a:endParaRPr lang="en-US"/>
           </a:p>
@@ -596,7 +596,7 @@
           <a:p>
             <a:fld id="{984BAFA8-0F6B-6148-A016-70C3358F5695}" type="datetimeFigureOut">
               <a:rPr lang="en-US" smtClean="0"/>
-              <a:t>9/26/19</a:t>
+              <a:t>9/27/19</a:t>
             </a:fld>
             <a:endParaRPr lang="en-US"/>
           </a:p>
@@ -766,7 +766,7 @@
           <a:p>
             <a:fld id="{984BAFA8-0F6B-6148-A016-70C3358F5695}" type="datetimeFigureOut">
               <a:rPr lang="en-US" smtClean="0"/>
-              <a:t>9/26/19</a:t>
+              <a:t>9/27/19</a:t>
             </a:fld>
             <a:endParaRPr lang="en-US"/>
           </a:p>
@@ -1012,7 +1012,7 @@
           <a:p>
             <a:fld id="{984BAFA8-0F6B-6148-A016-70C3358F5695}" type="datetimeFigureOut">
               <a:rPr lang="en-US" smtClean="0"/>
-              <a:t>9/26/19</a:t>
+              <a:t>9/27/19</a:t>
             </a:fld>
             <a:endParaRPr lang="en-US"/>
           </a:p>
@@ -1244,7 +1244,7 @@
           <a:p>
             <a:fld id="{984BAFA8-0F6B-6148-A016-70C3358F5695}" type="datetimeFigureOut">
               <a:rPr lang="en-US" smtClean="0"/>
-              <a:t>9/26/19</a:t>
+              <a:t>9/27/19</a:t>
             </a:fld>
             <a:endParaRPr lang="en-US"/>
           </a:p>
@@ -1611,7 +1611,7 @@
           <a:p>
             <a:fld id="{984BAFA8-0F6B-6148-A016-70C3358F5695}" type="datetimeFigureOut">
               <a:rPr lang="en-US" smtClean="0"/>
-              <a:t>9/26/19</a:t>
+              <a:t>9/27/19</a:t>
             </a:fld>
             <a:endParaRPr lang="en-US"/>
           </a:p>
@@ -1729,7 +1729,7 @@
           <a:p>
             <a:fld id="{984BAFA8-0F6B-6148-A016-70C3358F5695}" type="datetimeFigureOut">
               <a:rPr lang="en-US" smtClean="0"/>
-              <a:t>9/26/19</a:t>
+              <a:t>9/27/19</a:t>
             </a:fld>
             <a:endParaRPr lang="en-US"/>
           </a:p>
@@ -1824,7 +1824,7 @@
           <a:p>
             <a:fld id="{984BAFA8-0F6B-6148-A016-70C3358F5695}" type="datetimeFigureOut">
               <a:rPr lang="en-US" smtClean="0"/>
-              <a:t>9/26/19</a:t>
+              <a:t>9/27/19</a:t>
             </a:fld>
             <a:endParaRPr lang="en-US"/>
           </a:p>
@@ -2101,7 +2101,7 @@
           <a:p>
             <a:fld id="{984BAFA8-0F6B-6148-A016-70C3358F5695}" type="datetimeFigureOut">
               <a:rPr lang="en-US" smtClean="0"/>
-              <a:t>9/26/19</a:t>
+              <a:t>9/27/19</a:t>
             </a:fld>
             <a:endParaRPr lang="en-US"/>
           </a:p>
@@ -2358,7 +2358,7 @@
           <a:p>
             <a:fld id="{984BAFA8-0F6B-6148-A016-70C3358F5695}" type="datetimeFigureOut">
               <a:rPr lang="en-US" smtClean="0"/>
-              <a:t>9/26/19</a:t>
+              <a:t>9/27/19</a:t>
             </a:fld>
             <a:endParaRPr lang="en-US"/>
           </a:p>
@@ -2571,7 +2571,7 @@
           <a:p>
             <a:fld id="{984BAFA8-0F6B-6148-A016-70C3358F5695}" type="datetimeFigureOut">
               <a:rPr lang="en-US" smtClean="0"/>
-              <a:t>9/26/19</a:t>
+              <a:t>9/27/19</a:t>
             </a:fld>
             <a:endParaRPr lang="en-US"/>
           </a:p>
@@ -5906,6 +5906,150 @@
           <a:chExt cx="0" cy="0"/>
         </a:xfrm>
       </p:grpSpPr>
+      <p:grpSp>
+        <p:nvGrpSpPr>
+          <p:cNvPr id="5" name="Group 4">
+            <a:extLst>
+              <a:ext uri="{FF2B5EF4-FFF2-40B4-BE49-F238E27FC236}">
+                <a16:creationId xmlns:a16="http://schemas.microsoft.com/office/drawing/2014/main" id="{A6242DD4-5AA1-C74F-9B79-6D3129F07037}"/>
+              </a:ext>
+            </a:extLst>
+          </p:cNvPr>
+          <p:cNvGrpSpPr/>
+          <p:nvPr/>
+        </p:nvGrpSpPr>
+        <p:grpSpPr>
+          <a:xfrm>
+            <a:off x="0" y="0"/>
+            <a:ext cx="9143999" cy="5143499"/>
+            <a:chOff x="961552" y="1646679"/>
+            <a:chExt cx="4186014" cy="1433830"/>
+          </a:xfrm>
+        </p:grpSpPr>
+        <p:pic>
+          <p:nvPicPr>
+            <p:cNvPr id="2" name="Picture 1">
+              <a:extLst>
+                <a:ext uri="{FF2B5EF4-FFF2-40B4-BE49-F238E27FC236}">
+                  <a16:creationId xmlns:a16="http://schemas.microsoft.com/office/drawing/2014/main" id="{2A01A602-CB74-4A4B-AE93-20B8CEDE835F}"/>
+                </a:ext>
+              </a:extLst>
+            </p:cNvPr>
+            <p:cNvPicPr/>
+            <p:nvPr/>
+          </p:nvPicPr>
+          <p:blipFill rotWithShape="1">
+            <a:blip r:embed="rId2">
+              <a:extLst>
+                <a:ext uri="{28A0092B-C50C-407E-A947-70E740481C1C}">
+                  <a14:useLocalDpi xmlns:a14="http://schemas.microsoft.com/office/drawing/2010/main" val="0"/>
+                </a:ext>
+              </a:extLst>
+            </a:blip>
+            <a:srcRect b="18300"/>
+            <a:stretch/>
+          </p:blipFill>
+          <p:spPr bwMode="auto">
+            <a:xfrm>
+              <a:off x="961552" y="1646679"/>
+              <a:ext cx="1645285" cy="1433830"/>
+            </a:xfrm>
+            <a:prstGeom prst="rect">
+              <a:avLst/>
+            </a:prstGeom>
+            <a:ln>
+              <a:noFill/>
+            </a:ln>
+            <a:extLst>
+              <a:ext uri="{53640926-AAD7-44D8-BBD7-CCE9431645EC}">
+                <a14:shadowObscured xmlns:a14="http://schemas.microsoft.com/office/drawing/2010/main"/>
+              </a:ext>
+            </a:extLst>
+          </p:spPr>
+        </p:pic>
+        <p:pic>
+          <p:nvPicPr>
+            <p:cNvPr id="3" name="Picture 2">
+              <a:extLst>
+                <a:ext uri="{FF2B5EF4-FFF2-40B4-BE49-F238E27FC236}">
+                  <a16:creationId xmlns:a16="http://schemas.microsoft.com/office/drawing/2014/main" id="{3B71D5EE-0316-494F-B174-AB275DADDBE5}"/>
+                </a:ext>
+              </a:extLst>
+            </p:cNvPr>
+            <p:cNvPicPr/>
+            <p:nvPr/>
+          </p:nvPicPr>
+          <p:blipFill rotWithShape="1">
+            <a:blip r:embed="rId3">
+              <a:extLst>
+                <a:ext uri="{28A0092B-C50C-407E-A947-70E740481C1C}">
+                  <a14:useLocalDpi xmlns:a14="http://schemas.microsoft.com/office/drawing/2010/main" val="0"/>
+                </a:ext>
+              </a:extLst>
+            </a:blip>
+            <a:srcRect t="-1" r="54532" b="18795"/>
+            <a:stretch/>
+          </p:blipFill>
+          <p:spPr bwMode="auto">
+            <a:xfrm>
+              <a:off x="2681179" y="1658109"/>
+              <a:ext cx="746760" cy="1422400"/>
+            </a:xfrm>
+            <a:prstGeom prst="rect">
+              <a:avLst/>
+            </a:prstGeom>
+            <a:ln>
+              <a:noFill/>
+            </a:ln>
+            <a:extLst>
+              <a:ext uri="{53640926-AAD7-44D8-BBD7-CCE9431645EC}">
+                <a14:shadowObscured xmlns:a14="http://schemas.microsoft.com/office/drawing/2010/main"/>
+              </a:ext>
+            </a:extLst>
+          </p:spPr>
+        </p:pic>
+        <p:pic>
+          <p:nvPicPr>
+            <p:cNvPr id="4" name="Picture 3">
+              <a:extLst>
+                <a:ext uri="{FF2B5EF4-FFF2-40B4-BE49-F238E27FC236}">
+                  <a16:creationId xmlns:a16="http://schemas.microsoft.com/office/drawing/2014/main" id="{8E94DFF9-10C4-354D-B620-2B1F4ED5BCD6}"/>
+                </a:ext>
+              </a:extLst>
+            </p:cNvPr>
+            <p:cNvPicPr/>
+            <p:nvPr/>
+          </p:nvPicPr>
+          <p:blipFill rotWithShape="1">
+            <a:blip r:embed="rId4">
+              <a:extLst>
+                <a:ext uri="{28A0092B-C50C-407E-A947-70E740481C1C}">
+                  <a14:useLocalDpi xmlns:a14="http://schemas.microsoft.com/office/drawing/2010/main" val="0"/>
+                </a:ext>
+              </a:extLst>
+            </a:blip>
+            <a:srcRect b="18305"/>
+            <a:stretch/>
+          </p:blipFill>
+          <p:spPr bwMode="auto">
+            <a:xfrm>
+              <a:off x="3502281" y="1646679"/>
+              <a:ext cx="1645285" cy="1433195"/>
+            </a:xfrm>
+            <a:prstGeom prst="rect">
+              <a:avLst/>
+            </a:prstGeom>
+            <a:ln>
+              <a:noFill/>
+            </a:ln>
+            <a:extLst>
+              <a:ext uri="{53640926-AAD7-44D8-BBD7-CCE9431645EC}">
+                <a14:shadowObscured xmlns:a14="http://schemas.microsoft.com/office/drawing/2010/main"/>
+              </a:ext>
+            </a:extLst>
+          </p:spPr>
+        </p:pic>
+      </p:grpSp>
     </p:spTree>
     <p:extLst>
       <p:ext uri="{BB962C8B-B14F-4D97-AF65-F5344CB8AC3E}">

</xml_diff>